<commit_message>
Added into presentation for Open science.
</commit_message>
<xml_diff>
--- a/presentation/How to write.pptx
+++ b/presentation/How to write.pptx
@@ -120,6 +120,11 @@
       </a:defRPr>
     </a:lvl9pPr>
   </p:defaultTextStyle>
+  <p:extLst>
+    <p:ext uri="{EFAFB233-063F-42B5-8137-9DF3F51BA10A}">
+      <p15:sldGuideLst xmlns:p15="http://schemas.microsoft.com/office/powerpoint/2012/main"/>
+    </p:ext>
+  </p:extLst>
 </p:presentation>
 </file>
 
@@ -6054,6 +6059,13 @@
         </dgm:presLayoutVars>
       </dgm:prSet>
       <dgm:spPr/>
+      <dgm:t>
+        <a:bodyPr/>
+        <a:lstStyle/>
+        <a:p>
+          <a:endParaRPr lang="en-US"/>
+        </a:p>
+      </dgm:t>
     </dgm:pt>
     <dgm:pt modelId="{5E5FFFB6-3749-4F2B-B471-687F51A2FB26}" type="pres">
       <dgm:prSet presAssocID="{4ED91B23-41B0-4BDA-A1A0-2332B7A6972C}" presName="parentText" presStyleLbl="node1" presStyleIdx="0" presStyleCnt="4">
@@ -6063,6 +6075,13 @@
         </dgm:presLayoutVars>
       </dgm:prSet>
       <dgm:spPr/>
+      <dgm:t>
+        <a:bodyPr/>
+        <a:lstStyle/>
+        <a:p>
+          <a:endParaRPr lang="en-US"/>
+        </a:p>
+      </dgm:t>
     </dgm:pt>
     <dgm:pt modelId="{E8DA7735-9E8B-4143-9A1A-0142E53923CC}" type="pres">
       <dgm:prSet presAssocID="{4ED91B23-41B0-4BDA-A1A0-2332B7A6972C}" presName="childText" presStyleLbl="revTx" presStyleIdx="0" presStyleCnt="4">
@@ -6071,6 +6090,13 @@
         </dgm:presLayoutVars>
       </dgm:prSet>
       <dgm:spPr/>
+      <dgm:t>
+        <a:bodyPr/>
+        <a:lstStyle/>
+        <a:p>
+          <a:endParaRPr lang="en-US"/>
+        </a:p>
+      </dgm:t>
     </dgm:pt>
     <dgm:pt modelId="{F9F9AE66-1871-429F-96ED-DF501304AFF7}" type="pres">
       <dgm:prSet presAssocID="{B3061244-C510-4436-A512-6E2E234055A7}" presName="parentText" presStyleLbl="node1" presStyleIdx="1" presStyleCnt="4">
@@ -6080,6 +6106,13 @@
         </dgm:presLayoutVars>
       </dgm:prSet>
       <dgm:spPr/>
+      <dgm:t>
+        <a:bodyPr/>
+        <a:lstStyle/>
+        <a:p>
+          <a:endParaRPr lang="en-US"/>
+        </a:p>
+      </dgm:t>
     </dgm:pt>
     <dgm:pt modelId="{FC894E20-8156-4134-9E96-C75F913B82AD}" type="pres">
       <dgm:prSet presAssocID="{B3061244-C510-4436-A512-6E2E234055A7}" presName="childText" presStyleLbl="revTx" presStyleIdx="1" presStyleCnt="4">
@@ -6088,6 +6121,13 @@
         </dgm:presLayoutVars>
       </dgm:prSet>
       <dgm:spPr/>
+      <dgm:t>
+        <a:bodyPr/>
+        <a:lstStyle/>
+        <a:p>
+          <a:endParaRPr lang="en-US"/>
+        </a:p>
+      </dgm:t>
     </dgm:pt>
     <dgm:pt modelId="{263500F8-FF2F-429B-BFDE-35221E7BCE40}" type="pres">
       <dgm:prSet presAssocID="{C20E6EFF-3445-41DC-8BF6-F9B6669BB291}" presName="parentText" presStyleLbl="node1" presStyleIdx="2" presStyleCnt="4">
@@ -6097,6 +6137,13 @@
         </dgm:presLayoutVars>
       </dgm:prSet>
       <dgm:spPr/>
+      <dgm:t>
+        <a:bodyPr/>
+        <a:lstStyle/>
+        <a:p>
+          <a:endParaRPr lang="en-US"/>
+        </a:p>
+      </dgm:t>
     </dgm:pt>
     <dgm:pt modelId="{19D388BC-DD65-4927-A925-2601C85FD724}" type="pres">
       <dgm:prSet presAssocID="{C20E6EFF-3445-41DC-8BF6-F9B6669BB291}" presName="childText" presStyleLbl="revTx" presStyleIdx="2" presStyleCnt="4">
@@ -6105,6 +6152,13 @@
         </dgm:presLayoutVars>
       </dgm:prSet>
       <dgm:spPr/>
+      <dgm:t>
+        <a:bodyPr/>
+        <a:lstStyle/>
+        <a:p>
+          <a:endParaRPr lang="en-US"/>
+        </a:p>
+      </dgm:t>
     </dgm:pt>
     <dgm:pt modelId="{56DD79F2-C272-49DE-AAB8-6718ADA57C6F}" type="pres">
       <dgm:prSet presAssocID="{DCC59CF4-7240-4AD7-B170-944C19125793}" presName="parentText" presStyleLbl="node1" presStyleIdx="3" presStyleCnt="4">
@@ -6114,6 +6168,13 @@
         </dgm:presLayoutVars>
       </dgm:prSet>
       <dgm:spPr/>
+      <dgm:t>
+        <a:bodyPr/>
+        <a:lstStyle/>
+        <a:p>
+          <a:endParaRPr lang="en-US"/>
+        </a:p>
+      </dgm:t>
     </dgm:pt>
     <dgm:pt modelId="{5C1CA46E-3267-40AF-BEFC-B445B3A84E6B}" type="pres">
       <dgm:prSet presAssocID="{DCC59CF4-7240-4AD7-B170-944C19125793}" presName="childText" presStyleLbl="revTx" presStyleIdx="3" presStyleCnt="4">
@@ -6122,26 +6183,33 @@
         </dgm:presLayoutVars>
       </dgm:prSet>
       <dgm:spPr/>
+      <dgm:t>
+        <a:bodyPr/>
+        <a:lstStyle/>
+        <a:p>
+          <a:endParaRPr lang="en-US"/>
+        </a:p>
+      </dgm:t>
     </dgm:pt>
   </dgm:ptLst>
   <dgm:cxnLst>
-    <dgm:cxn modelId="{620E760B-155B-4FD4-B22E-125E52F49648}" srcId="{74BAF907-FF12-4EAC-BB29-0044F3C06244}" destId="{DCC59CF4-7240-4AD7-B170-944C19125793}" srcOrd="3" destOrd="0" parTransId="{086AF86B-1749-4FE3-9075-871F8A9AE4A4}" sibTransId="{039889ED-8D8A-45D4-8574-3E662DA10C0C}"/>
+    <dgm:cxn modelId="{7C2DA340-1420-4DBE-8426-659ED2EFD229}" srcId="{B3061244-C510-4436-A512-6E2E234055A7}" destId="{D837F1B9-958B-49E2-94E8-A6AB731E338E}" srcOrd="0" destOrd="0" parTransId="{9EEE1431-B4D4-4001-8E50-62A0C7679E84}" sibTransId="{89C439A7-D420-437C-8886-3E4C830FE1DE}"/>
+    <dgm:cxn modelId="{E099C8D3-F7B3-40C6-9630-15B2BDE87B98}" type="presOf" srcId="{4ED91B23-41B0-4BDA-A1A0-2332B7A6972C}" destId="{5E5FFFB6-3749-4F2B-B471-687F51A2FB26}" srcOrd="0" destOrd="0" presId="urn:microsoft.com/office/officeart/2005/8/layout/vList2"/>
+    <dgm:cxn modelId="{AC8B8FA7-8713-4915-A1C8-7E0AAD6C433A}" type="presOf" srcId="{74BAF907-FF12-4EAC-BB29-0044F3C06244}" destId="{E5B9457D-73F5-4EA5-B35A-C334BE6D94A6}" srcOrd="0" destOrd="0" presId="urn:microsoft.com/office/officeart/2005/8/layout/vList2"/>
+    <dgm:cxn modelId="{E4E565AD-707B-456C-9364-08E60FD3C0E3}" srcId="{DCC59CF4-7240-4AD7-B170-944C19125793}" destId="{C880FC26-D731-462D-819B-561F90E50A40}" srcOrd="0" destOrd="0" parTransId="{DD1FBF5C-4F4C-4A23-8512-8608DC5909AA}" sibTransId="{7151661F-33DD-4AC1-B702-3F01B62B5CAB}"/>
+    <dgm:cxn modelId="{E0EFA694-61CA-46DA-9D78-E0523AB2DC14}" srcId="{4ED91B23-41B0-4BDA-A1A0-2332B7A6972C}" destId="{704DB07F-33C2-45CF-BE8D-2CE7B4D24AEF}" srcOrd="0" destOrd="0" parTransId="{F45CEE1F-0B6F-4890-8CBE-7E2828A1BD17}" sibTransId="{0F85188C-D0A1-4D37-895D-245DB059D44B}"/>
     <dgm:cxn modelId="{FDF31B2D-26E8-4206-9260-7BB68CFC4C50}" type="presOf" srcId="{DCC59CF4-7240-4AD7-B170-944C19125793}" destId="{56DD79F2-C272-49DE-AAB8-6718ADA57C6F}" srcOrd="0" destOrd="0" presId="urn:microsoft.com/office/officeart/2005/8/layout/vList2"/>
-    <dgm:cxn modelId="{7C2DA340-1420-4DBE-8426-659ED2EFD229}" srcId="{B3061244-C510-4436-A512-6E2E234055A7}" destId="{D837F1B9-958B-49E2-94E8-A6AB731E338E}" srcOrd="0" destOrd="0" parTransId="{9EEE1431-B4D4-4001-8E50-62A0C7679E84}" sibTransId="{89C439A7-D420-437C-8886-3E4C830FE1DE}"/>
+    <dgm:cxn modelId="{814279A6-3F36-47C4-A52C-018DB880EF2C}" srcId="{74BAF907-FF12-4EAC-BB29-0044F3C06244}" destId="{4ED91B23-41B0-4BDA-A1A0-2332B7A6972C}" srcOrd="0" destOrd="0" parTransId="{BDF00A9B-516C-4ED4-B4B9-2C17D1C25BEE}" sibTransId="{F4719CBE-477A-471B-8B72-727E900CD83A}"/>
     <dgm:cxn modelId="{F355E464-35EA-43CB-BE56-22E20B21BC61}" type="presOf" srcId="{D837F1B9-958B-49E2-94E8-A6AB731E338E}" destId="{FC894E20-8156-4134-9E96-C75F913B82AD}" srcOrd="0" destOrd="0" presId="urn:microsoft.com/office/officeart/2005/8/layout/vList2"/>
+    <dgm:cxn modelId="{F21A5AB7-8621-49DD-940F-B4E5B954EE02}" srcId="{74BAF907-FF12-4EAC-BB29-0044F3C06244}" destId="{B3061244-C510-4436-A512-6E2E234055A7}" srcOrd="1" destOrd="0" parTransId="{2D7E6E40-EF5B-46A6-B746-8F4DC124C7CF}" sibTransId="{91AB66A9-AC64-4BDC-9E25-0C24CB10C46A}"/>
+    <dgm:cxn modelId="{19D05BAC-37CB-4268-9712-5BBE5A96B542}" type="presOf" srcId="{B3061244-C510-4436-A512-6E2E234055A7}" destId="{F9F9AE66-1871-429F-96ED-DF501304AFF7}" srcOrd="0" destOrd="0" presId="urn:microsoft.com/office/officeart/2005/8/layout/vList2"/>
+    <dgm:cxn modelId="{0A5415C5-78D5-4BD0-BB99-77C2011C8EDD}" srcId="{C20E6EFF-3445-41DC-8BF6-F9B6669BB291}" destId="{CC61DC9A-C733-4D1A-AA56-5FEC6DDE842D}" srcOrd="0" destOrd="0" parTransId="{066817D7-DE06-4BAE-983A-7139135446D2}" sibTransId="{B47420E6-C70E-41B9-BA6F-76293B860AEC}"/>
     <dgm:cxn modelId="{E640304A-6E57-40F1-B645-CE26FA43CF57}" type="presOf" srcId="{C20E6EFF-3445-41DC-8BF6-F9B6669BB291}" destId="{263500F8-FF2F-429B-BFDE-35221E7BCE40}" srcOrd="0" destOrd="0" presId="urn:microsoft.com/office/officeart/2005/8/layout/vList2"/>
     <dgm:cxn modelId="{5E0E544C-951B-4094-8F92-081D39A19CC3}" type="presOf" srcId="{C880FC26-D731-462D-819B-561F90E50A40}" destId="{5C1CA46E-3267-40AF-BEFC-B445B3A84E6B}" srcOrd="0" destOrd="0" presId="urn:microsoft.com/office/officeart/2005/8/layout/vList2"/>
-    <dgm:cxn modelId="{E0EFA694-61CA-46DA-9D78-E0523AB2DC14}" srcId="{4ED91B23-41B0-4BDA-A1A0-2332B7A6972C}" destId="{704DB07F-33C2-45CF-BE8D-2CE7B4D24AEF}" srcOrd="0" destOrd="0" parTransId="{F45CEE1F-0B6F-4890-8CBE-7E2828A1BD17}" sibTransId="{0F85188C-D0A1-4D37-895D-245DB059D44B}"/>
-    <dgm:cxn modelId="{814279A6-3F36-47C4-A52C-018DB880EF2C}" srcId="{74BAF907-FF12-4EAC-BB29-0044F3C06244}" destId="{4ED91B23-41B0-4BDA-A1A0-2332B7A6972C}" srcOrd="0" destOrd="0" parTransId="{BDF00A9B-516C-4ED4-B4B9-2C17D1C25BEE}" sibTransId="{F4719CBE-477A-471B-8B72-727E900CD83A}"/>
-    <dgm:cxn modelId="{AC8B8FA7-8713-4915-A1C8-7E0AAD6C433A}" type="presOf" srcId="{74BAF907-FF12-4EAC-BB29-0044F3C06244}" destId="{E5B9457D-73F5-4EA5-B35A-C334BE6D94A6}" srcOrd="0" destOrd="0" presId="urn:microsoft.com/office/officeart/2005/8/layout/vList2"/>
-    <dgm:cxn modelId="{19D05BAC-37CB-4268-9712-5BBE5A96B542}" type="presOf" srcId="{B3061244-C510-4436-A512-6E2E234055A7}" destId="{F9F9AE66-1871-429F-96ED-DF501304AFF7}" srcOrd="0" destOrd="0" presId="urn:microsoft.com/office/officeart/2005/8/layout/vList2"/>
-    <dgm:cxn modelId="{E4E565AD-707B-456C-9364-08E60FD3C0E3}" srcId="{DCC59CF4-7240-4AD7-B170-944C19125793}" destId="{C880FC26-D731-462D-819B-561F90E50A40}" srcOrd="0" destOrd="0" parTransId="{DD1FBF5C-4F4C-4A23-8512-8608DC5909AA}" sibTransId="{7151661F-33DD-4AC1-B702-3F01B62B5CAB}"/>
-    <dgm:cxn modelId="{F21A5AB7-8621-49DD-940F-B4E5B954EE02}" srcId="{74BAF907-FF12-4EAC-BB29-0044F3C06244}" destId="{B3061244-C510-4436-A512-6E2E234055A7}" srcOrd="1" destOrd="0" parTransId="{2D7E6E40-EF5B-46A6-B746-8F4DC124C7CF}" sibTransId="{91AB66A9-AC64-4BDC-9E25-0C24CB10C46A}"/>
-    <dgm:cxn modelId="{0A5415C5-78D5-4BD0-BB99-77C2011C8EDD}" srcId="{C20E6EFF-3445-41DC-8BF6-F9B6669BB291}" destId="{CC61DC9A-C733-4D1A-AA56-5FEC6DDE842D}" srcOrd="0" destOrd="0" parTransId="{066817D7-DE06-4BAE-983A-7139135446D2}" sibTransId="{B47420E6-C70E-41B9-BA6F-76293B860AEC}"/>
+    <dgm:cxn modelId="{620E760B-155B-4FD4-B22E-125E52F49648}" srcId="{74BAF907-FF12-4EAC-BB29-0044F3C06244}" destId="{DCC59CF4-7240-4AD7-B170-944C19125793}" srcOrd="3" destOrd="0" parTransId="{086AF86B-1749-4FE3-9075-871F8A9AE4A4}" sibTransId="{039889ED-8D8A-45D4-8574-3E662DA10C0C}"/>
+    <dgm:cxn modelId="{632576E7-D5B0-494E-ABCD-BBD02B8442D7}" type="presOf" srcId="{704DB07F-33C2-45CF-BE8D-2CE7B4D24AEF}" destId="{E8DA7735-9E8B-4143-9A1A-0142E53923CC}" srcOrd="0" destOrd="0" presId="urn:microsoft.com/office/officeart/2005/8/layout/vList2"/>
+    <dgm:cxn modelId="{4C8BA8D5-A12A-4A57-B9AB-B3986AB060CE}" srcId="{74BAF907-FF12-4EAC-BB29-0044F3C06244}" destId="{C20E6EFF-3445-41DC-8BF6-F9B6669BB291}" srcOrd="2" destOrd="0" parTransId="{D587EDD5-2FFF-4D73-8B83-F2CB643AC53C}" sibTransId="{DE00BA4F-C152-4274-BBA8-064F24F6D2D1}"/>
     <dgm:cxn modelId="{36B259C6-A72E-44E7-BDCD-081751CCD1A2}" type="presOf" srcId="{CC61DC9A-C733-4D1A-AA56-5FEC6DDE842D}" destId="{19D388BC-DD65-4927-A925-2601C85FD724}" srcOrd="0" destOrd="0" presId="urn:microsoft.com/office/officeart/2005/8/layout/vList2"/>
-    <dgm:cxn modelId="{E099C8D3-F7B3-40C6-9630-15B2BDE87B98}" type="presOf" srcId="{4ED91B23-41B0-4BDA-A1A0-2332B7A6972C}" destId="{5E5FFFB6-3749-4F2B-B471-687F51A2FB26}" srcOrd="0" destOrd="0" presId="urn:microsoft.com/office/officeart/2005/8/layout/vList2"/>
-    <dgm:cxn modelId="{4C8BA8D5-A12A-4A57-B9AB-B3986AB060CE}" srcId="{74BAF907-FF12-4EAC-BB29-0044F3C06244}" destId="{C20E6EFF-3445-41DC-8BF6-F9B6669BB291}" srcOrd="2" destOrd="0" parTransId="{D587EDD5-2FFF-4D73-8B83-F2CB643AC53C}" sibTransId="{DE00BA4F-C152-4274-BBA8-064F24F6D2D1}"/>
-    <dgm:cxn modelId="{632576E7-D5B0-494E-ABCD-BBD02B8442D7}" type="presOf" srcId="{704DB07F-33C2-45CF-BE8D-2CE7B4D24AEF}" destId="{E8DA7735-9E8B-4143-9A1A-0142E53923CC}" srcOrd="0" destOrd="0" presId="urn:microsoft.com/office/officeart/2005/8/layout/vList2"/>
     <dgm:cxn modelId="{4923FA92-F2AC-4E6A-9D61-CF036F167296}" type="presParOf" srcId="{E5B9457D-73F5-4EA5-B35A-C334BE6D94A6}" destId="{5E5FFFB6-3749-4F2B-B471-687F51A2FB26}" srcOrd="0" destOrd="0" presId="urn:microsoft.com/office/officeart/2005/8/layout/vList2"/>
     <dgm:cxn modelId="{5626B96F-BE99-4D22-9786-A22F9D4059AB}" type="presParOf" srcId="{E5B9457D-73F5-4EA5-B35A-C334BE6D94A6}" destId="{E8DA7735-9E8B-4143-9A1A-0142E53923CC}" srcOrd="1" destOrd="0" presId="urn:microsoft.com/office/officeart/2005/8/layout/vList2"/>
     <dgm:cxn modelId="{FED82449-6E2A-4FB6-926D-E291A1E11271}" type="presParOf" srcId="{E5B9457D-73F5-4EA5-B35A-C334BE6D94A6}" destId="{F9F9AE66-1871-429F-96ED-DF501304AFF7}" srcOrd="2" destOrd="0" presId="urn:microsoft.com/office/officeart/2005/8/layout/vList2"/>
@@ -6405,6 +6473,13 @@
         </dgm:presLayoutVars>
       </dgm:prSet>
       <dgm:spPr/>
+      <dgm:t>
+        <a:bodyPr/>
+        <a:lstStyle/>
+        <a:p>
+          <a:endParaRPr lang="en-US"/>
+        </a:p>
+      </dgm:t>
     </dgm:pt>
     <dgm:pt modelId="{F044651B-2B87-4BE0-A41E-701339B5D068}" type="pres">
       <dgm:prSet presAssocID="{F68DCE02-BC18-46D9-B58F-907CB86B59AB}" presName="compNode" presStyleCnt="0"/>
@@ -6418,13 +6493,13 @@
       <dgm:prSet presAssocID="{F68DCE02-BC18-46D9-B58F-907CB86B59AB}" presName="iconRect" presStyleLbl="node1" presStyleIdx="0" presStyleCnt="6"/>
       <dgm:spPr>
         <a:blipFill>
-          <a:blip xmlns:r="http://schemas.openxmlformats.org/officeDocument/2006/relationships" r:embed="rId1">
+          <a:blip xmlns:r="http://schemas.openxmlformats.org/officeDocument/2006/relationships" r:embed="rId1" cstate="hqprint">
             <a:extLst>
               <a:ext uri="{28A0092B-C50C-407E-A947-70E740481C1C}">
                 <a14:useLocalDpi xmlns:a14="http://schemas.microsoft.com/office/drawing/2010/main" val="0"/>
               </a:ext>
               <a:ext uri="{96DAC541-7B7A-43D3-8B79-37D633B846F1}">
-                <asvg:svgBlip xmlns:asvg="http://schemas.microsoft.com/office/drawing/2016/SVG/main" r:embed="rId2"/>
+                <asvg:svgBlip xmlns:asvg="http://schemas.microsoft.com/office/drawing/2016/SVG/main" xmlns="" r:embed="rId2"/>
               </a:ext>
             </a:extLst>
           </a:blip>
@@ -6436,6 +6511,13 @@
           <a:noFill/>
         </a:ln>
       </dgm:spPr>
+      <dgm:t>
+        <a:bodyPr/>
+        <a:lstStyle/>
+        <a:p>
+          <a:endParaRPr lang="en-US"/>
+        </a:p>
+      </dgm:t>
       <dgm:extLst>
         <a:ext uri="{E40237B7-FDA0-4F09-8148-C483321AD2D9}">
           <dgm14:cNvPr xmlns:dgm14="http://schemas.microsoft.com/office/drawing/2010/diagram" id="0" name="" descr="Database"/>
@@ -6454,6 +6536,13 @@
         </dgm:presLayoutVars>
       </dgm:prSet>
       <dgm:spPr/>
+      <dgm:t>
+        <a:bodyPr/>
+        <a:lstStyle/>
+        <a:p>
+          <a:endParaRPr lang="en-US"/>
+        </a:p>
+      </dgm:t>
     </dgm:pt>
     <dgm:pt modelId="{8083A2C8-5EBC-4A7E-A01B-B91D7702E93D}" type="pres">
       <dgm:prSet presAssocID="{50D86349-7B8E-4400-8A49-641692555B5C}" presName="sibTrans" presStyleCnt="0"/>
@@ -6471,13 +6560,13 @@
       <dgm:prSet presAssocID="{035D0503-E3D9-4A65-B1BD-B6C2FEEBBF53}" presName="iconRect" presStyleLbl="node1" presStyleIdx="1" presStyleCnt="6"/>
       <dgm:spPr>
         <a:blipFill>
-          <a:blip xmlns:r="http://schemas.openxmlformats.org/officeDocument/2006/relationships" r:embed="rId3">
+          <a:blip xmlns:r="http://schemas.openxmlformats.org/officeDocument/2006/relationships" r:embed="rId3" cstate="hqprint">
             <a:extLst>
               <a:ext uri="{28A0092B-C50C-407E-A947-70E740481C1C}">
                 <a14:useLocalDpi xmlns:a14="http://schemas.microsoft.com/office/drawing/2010/main" val="0"/>
               </a:ext>
               <a:ext uri="{96DAC541-7B7A-43D3-8B79-37D633B846F1}">
-                <asvg:svgBlip xmlns:asvg="http://schemas.microsoft.com/office/drawing/2016/SVG/main" r:embed="rId4"/>
+                <asvg:svgBlip xmlns:asvg="http://schemas.microsoft.com/office/drawing/2016/SVG/main" xmlns="" r:embed="rId4"/>
               </a:ext>
             </a:extLst>
           </a:blip>
@@ -6489,6 +6578,13 @@
           <a:noFill/>
         </a:ln>
       </dgm:spPr>
+      <dgm:t>
+        <a:bodyPr/>
+        <a:lstStyle/>
+        <a:p>
+          <a:endParaRPr lang="en-US"/>
+        </a:p>
+      </dgm:t>
       <dgm:extLst>
         <a:ext uri="{E40237B7-FDA0-4F09-8148-C483321AD2D9}">
           <dgm14:cNvPr xmlns:dgm14="http://schemas.microsoft.com/office/drawing/2010/diagram" id="0" name="" descr="Stopwatch"/>
@@ -6507,6 +6603,13 @@
         </dgm:presLayoutVars>
       </dgm:prSet>
       <dgm:spPr/>
+      <dgm:t>
+        <a:bodyPr/>
+        <a:lstStyle/>
+        <a:p>
+          <a:endParaRPr lang="en-US"/>
+        </a:p>
+      </dgm:t>
     </dgm:pt>
     <dgm:pt modelId="{A4AF0E4F-8FFF-4ECA-ACE5-07C2DEF2918F}" type="pres">
       <dgm:prSet presAssocID="{65DEB577-895B-4EF0-8750-630FCA2CB2EE}" presName="sibTrans" presStyleCnt="0"/>
@@ -6524,13 +6627,13 @@
       <dgm:prSet presAssocID="{7E023733-9223-4B9E-93DB-7D28491644B2}" presName="iconRect" presStyleLbl="node1" presStyleIdx="2" presStyleCnt="6"/>
       <dgm:spPr>
         <a:blipFill>
-          <a:blip xmlns:r="http://schemas.openxmlformats.org/officeDocument/2006/relationships" r:embed="rId5">
+          <a:blip xmlns:r="http://schemas.openxmlformats.org/officeDocument/2006/relationships" r:embed="rId5" cstate="hqprint">
             <a:extLst>
               <a:ext uri="{28A0092B-C50C-407E-A947-70E740481C1C}">
                 <a14:useLocalDpi xmlns:a14="http://schemas.microsoft.com/office/drawing/2010/main" val="0"/>
               </a:ext>
               <a:ext uri="{96DAC541-7B7A-43D3-8B79-37D633B846F1}">
-                <asvg:svgBlip xmlns:asvg="http://schemas.microsoft.com/office/drawing/2016/SVG/main" r:embed="rId6"/>
+                <asvg:svgBlip xmlns:asvg="http://schemas.microsoft.com/office/drawing/2016/SVG/main" xmlns="" r:embed="rId6"/>
               </a:ext>
             </a:extLst>
           </a:blip>
@@ -6542,6 +6645,13 @@
           <a:noFill/>
         </a:ln>
       </dgm:spPr>
+      <dgm:t>
+        <a:bodyPr/>
+        <a:lstStyle/>
+        <a:p>
+          <a:endParaRPr lang="en-US"/>
+        </a:p>
+      </dgm:t>
       <dgm:extLst>
         <a:ext uri="{E40237B7-FDA0-4F09-8148-C483321AD2D9}">
           <dgm14:cNvPr xmlns:dgm14="http://schemas.microsoft.com/office/drawing/2010/diagram" id="0" name="" descr="Plant"/>
@@ -6560,6 +6670,13 @@
         </dgm:presLayoutVars>
       </dgm:prSet>
       <dgm:spPr/>
+      <dgm:t>
+        <a:bodyPr/>
+        <a:lstStyle/>
+        <a:p>
+          <a:endParaRPr lang="en-US"/>
+        </a:p>
+      </dgm:t>
     </dgm:pt>
     <dgm:pt modelId="{AF84C109-DD39-4421-B3E7-743BF3C45BC2}" type="pres">
       <dgm:prSet presAssocID="{19F4D66C-7B1B-4515-8BBA-890C8B5F0E39}" presName="sibTrans" presStyleCnt="0"/>
@@ -6577,13 +6694,13 @@
       <dgm:prSet presAssocID="{55A82723-B62F-4479-9A20-F8CB5925C6A9}" presName="iconRect" presStyleLbl="node1" presStyleIdx="3" presStyleCnt="6"/>
       <dgm:spPr>
         <a:blipFill>
-          <a:blip xmlns:r="http://schemas.openxmlformats.org/officeDocument/2006/relationships" r:embed="rId7">
+          <a:blip xmlns:r="http://schemas.openxmlformats.org/officeDocument/2006/relationships" r:embed="rId7" cstate="hqprint">
             <a:extLst>
               <a:ext uri="{28A0092B-C50C-407E-A947-70E740481C1C}">
                 <a14:useLocalDpi xmlns:a14="http://schemas.microsoft.com/office/drawing/2010/main" val="0"/>
               </a:ext>
               <a:ext uri="{96DAC541-7B7A-43D3-8B79-37D633B846F1}">
-                <asvg:svgBlip xmlns:asvg="http://schemas.microsoft.com/office/drawing/2016/SVG/main" r:embed="rId8"/>
+                <asvg:svgBlip xmlns:asvg="http://schemas.microsoft.com/office/drawing/2016/SVG/main" xmlns="" r:embed="rId8"/>
               </a:ext>
             </a:extLst>
           </a:blip>
@@ -6595,6 +6712,13 @@
           <a:noFill/>
         </a:ln>
       </dgm:spPr>
+      <dgm:t>
+        <a:bodyPr/>
+        <a:lstStyle/>
+        <a:p>
+          <a:endParaRPr lang="en-US"/>
+        </a:p>
+      </dgm:t>
       <dgm:extLst>
         <a:ext uri="{E40237B7-FDA0-4F09-8148-C483321AD2D9}">
           <dgm14:cNvPr xmlns:dgm14="http://schemas.microsoft.com/office/drawing/2010/diagram" id="0" name="" descr="Checkmark"/>
@@ -6613,6 +6737,13 @@
         </dgm:presLayoutVars>
       </dgm:prSet>
       <dgm:spPr/>
+      <dgm:t>
+        <a:bodyPr/>
+        <a:lstStyle/>
+        <a:p>
+          <a:endParaRPr lang="en-US"/>
+        </a:p>
+      </dgm:t>
     </dgm:pt>
     <dgm:pt modelId="{880C5CBD-33C2-4054-B117-F56BD70FF01F}" type="pres">
       <dgm:prSet presAssocID="{5BED4A02-6FAB-4F36-96C2-EFC6F5CDDA0E}" presName="sibTrans" presStyleCnt="0"/>
@@ -6630,13 +6761,13 @@
       <dgm:prSet presAssocID="{ECD5B12B-0838-4BFA-B6AC-66B632A0CC0F}" presName="iconRect" presStyleLbl="node1" presStyleIdx="4" presStyleCnt="6"/>
       <dgm:spPr>
         <a:blipFill>
-          <a:blip xmlns:r="http://schemas.openxmlformats.org/officeDocument/2006/relationships" r:embed="rId9">
+          <a:blip xmlns:r="http://schemas.openxmlformats.org/officeDocument/2006/relationships" r:embed="rId9" cstate="hqprint">
             <a:extLst>
               <a:ext uri="{28A0092B-C50C-407E-A947-70E740481C1C}">
                 <a14:useLocalDpi xmlns:a14="http://schemas.microsoft.com/office/drawing/2010/main" val="0"/>
               </a:ext>
               <a:ext uri="{96DAC541-7B7A-43D3-8B79-37D633B846F1}">
-                <asvg:svgBlip xmlns:asvg="http://schemas.microsoft.com/office/drawing/2016/SVG/main" r:embed="rId10"/>
+                <asvg:svgBlip xmlns:asvg="http://schemas.microsoft.com/office/drawing/2016/SVG/main" xmlns="" r:embed="rId10"/>
               </a:ext>
             </a:extLst>
           </a:blip>
@@ -6648,6 +6779,13 @@
           <a:noFill/>
         </a:ln>
       </dgm:spPr>
+      <dgm:t>
+        <a:bodyPr/>
+        <a:lstStyle/>
+        <a:p>
+          <a:endParaRPr lang="en-US"/>
+        </a:p>
+      </dgm:t>
       <dgm:extLst>
         <a:ext uri="{E40237B7-FDA0-4F09-8148-C483321AD2D9}">
           <dgm14:cNvPr xmlns:dgm14="http://schemas.microsoft.com/office/drawing/2010/diagram" id="0" name="" descr="Newspaper"/>
@@ -6666,6 +6804,13 @@
         </dgm:presLayoutVars>
       </dgm:prSet>
       <dgm:spPr/>
+      <dgm:t>
+        <a:bodyPr/>
+        <a:lstStyle/>
+        <a:p>
+          <a:endParaRPr lang="en-US"/>
+        </a:p>
+      </dgm:t>
     </dgm:pt>
     <dgm:pt modelId="{35837B94-5F85-4B59-8B9A-07B37DB47054}" type="pres">
       <dgm:prSet presAssocID="{F5BB41AA-6A32-4508-A78D-ED957AB15191}" presName="sibTrans" presStyleCnt="0"/>
@@ -6683,13 +6828,13 @@
       <dgm:prSet presAssocID="{A16B1EB1-9F24-4976-9F9A-E049E2DF63E5}" presName="iconRect" presStyleLbl="node1" presStyleIdx="5" presStyleCnt="6"/>
       <dgm:spPr>
         <a:blipFill>
-          <a:blip xmlns:r="http://schemas.openxmlformats.org/officeDocument/2006/relationships" r:embed="rId11">
+          <a:blip xmlns:r="http://schemas.openxmlformats.org/officeDocument/2006/relationships" r:embed="rId11" cstate="hqprint">
             <a:extLst>
               <a:ext uri="{28A0092B-C50C-407E-A947-70E740481C1C}">
                 <a14:useLocalDpi xmlns:a14="http://schemas.microsoft.com/office/drawing/2010/main" val="0"/>
               </a:ext>
               <a:ext uri="{96DAC541-7B7A-43D3-8B79-37D633B846F1}">
-                <asvg:svgBlip xmlns:asvg="http://schemas.microsoft.com/office/drawing/2016/SVG/main" r:embed="rId12"/>
+                <asvg:svgBlip xmlns:asvg="http://schemas.microsoft.com/office/drawing/2016/SVG/main" xmlns="" r:embed="rId12"/>
               </a:ext>
             </a:extLst>
           </a:blip>
@@ -6701,6 +6846,13 @@
           <a:noFill/>
         </a:ln>
       </dgm:spPr>
+      <dgm:t>
+        <a:bodyPr/>
+        <a:lstStyle/>
+        <a:p>
+          <a:endParaRPr lang="en-US"/>
+        </a:p>
+      </dgm:t>
       <dgm:extLst>
         <a:ext uri="{E40237B7-FDA0-4F09-8148-C483321AD2D9}">
           <dgm14:cNvPr xmlns:dgm14="http://schemas.microsoft.com/office/drawing/2010/diagram" id="0" name="" descr="Head with Gears"/>
@@ -6719,21 +6871,28 @@
         </dgm:presLayoutVars>
       </dgm:prSet>
       <dgm:spPr/>
+      <dgm:t>
+        <a:bodyPr/>
+        <a:lstStyle/>
+        <a:p>
+          <a:endParaRPr lang="en-US"/>
+        </a:p>
+      </dgm:t>
     </dgm:pt>
   </dgm:ptLst>
   <dgm:cxnLst>
+    <dgm:cxn modelId="{38D6DFE4-2569-46F1-ADB6-F574ADC0C6D9}" type="presOf" srcId="{55A82723-B62F-4479-9A20-F8CB5925C6A9}" destId="{761C0F73-DBB3-49A6-828D-807E2E405800}" srcOrd="0" destOrd="0" presId="urn:microsoft.com/office/officeart/2018/2/layout/IconVerticalSolidList"/>
+    <dgm:cxn modelId="{FD8A61CC-FA28-4681-8A98-E5C7D08C50E2}" srcId="{3A48E02F-AD24-407C-A7C9-0C7BE1B5ADD8}" destId="{7E023733-9223-4B9E-93DB-7D28491644B2}" srcOrd="2" destOrd="0" parTransId="{E6BB0F8D-5BC5-46F6-A280-D97EEC647EDE}" sibTransId="{19F4D66C-7B1B-4515-8BBA-890C8B5F0E39}"/>
+    <dgm:cxn modelId="{2E172BBA-EEEA-41CD-8212-D3292D511080}" srcId="{3A48E02F-AD24-407C-A7C9-0C7BE1B5ADD8}" destId="{A16B1EB1-9F24-4976-9F9A-E049E2DF63E5}" srcOrd="5" destOrd="0" parTransId="{EB7AEA7B-0ACD-4FBA-B0A8-E6ADF59F0D6A}" sibTransId="{72758E6A-0B87-4F17-9ACE-6D21E39A5B70}"/>
+    <dgm:cxn modelId="{BB771915-9C49-4A82-A0BF-9C2C94C9F36E}" srcId="{3A48E02F-AD24-407C-A7C9-0C7BE1B5ADD8}" destId="{035D0503-E3D9-4A65-B1BD-B6C2FEEBBF53}" srcOrd="1" destOrd="0" parTransId="{73EE19A6-1DEE-4558-A21E-CC9A8036B8F7}" sibTransId="{65DEB577-895B-4EF0-8750-630FCA2CB2EE}"/>
+    <dgm:cxn modelId="{A6F5C39B-CCAC-44BD-9156-EA9DC0C6CE8F}" type="presOf" srcId="{035D0503-E3D9-4A65-B1BD-B6C2FEEBBF53}" destId="{5500A5F9-48A6-4483-997D-1CBE7AD8CD35}" srcOrd="0" destOrd="0" presId="urn:microsoft.com/office/officeart/2018/2/layout/IconVerticalSolidList"/>
+    <dgm:cxn modelId="{A11763C8-4EB9-4433-BC15-07F541E8781D}" type="presOf" srcId="{A16B1EB1-9F24-4976-9F9A-E049E2DF63E5}" destId="{D15FFAA8-50FE-4CE4-AF35-6286C3DBADCB}" srcOrd="0" destOrd="0" presId="urn:microsoft.com/office/officeart/2018/2/layout/IconVerticalSolidList"/>
+    <dgm:cxn modelId="{8FA1AD88-7981-417E-AFDE-A146CBD28E01}" type="presOf" srcId="{3A48E02F-AD24-407C-A7C9-0C7BE1B5ADD8}" destId="{7124F8D1-E8F4-4AE2-A5BB-4F7B6078CE41}" srcOrd="0" destOrd="0" presId="urn:microsoft.com/office/officeart/2018/2/layout/IconVerticalSolidList"/>
+    <dgm:cxn modelId="{491A9A66-2771-4C13-BE7C-62AE3F4A63DE}" srcId="{3A48E02F-AD24-407C-A7C9-0C7BE1B5ADD8}" destId="{ECD5B12B-0838-4BFA-B6AC-66B632A0CC0F}" srcOrd="4" destOrd="0" parTransId="{B3F1D2D2-6900-4D7B-82FA-ED215ABD9761}" sibTransId="{F5BB41AA-6A32-4508-A78D-ED957AB15191}"/>
+    <dgm:cxn modelId="{F97F30B9-51FE-465A-9CD2-DB6E98366AEF}" type="presOf" srcId="{F68DCE02-BC18-46D9-B58F-907CB86B59AB}" destId="{25398577-2BAF-451D-914E-7493361A9090}" srcOrd="0" destOrd="0" presId="urn:microsoft.com/office/officeart/2018/2/layout/IconVerticalSolidList"/>
+    <dgm:cxn modelId="{64763728-3C46-40E7-A544-4C6A60197C7B}" type="presOf" srcId="{ECD5B12B-0838-4BFA-B6AC-66B632A0CC0F}" destId="{9E22DA28-55E1-4432-9B4E-71D9DBC68838}" srcOrd="0" destOrd="0" presId="urn:microsoft.com/office/officeart/2018/2/layout/IconVerticalSolidList"/>
+    <dgm:cxn modelId="{D4C39974-E53F-408B-A3E6-C0B721F2D386}" srcId="{3A48E02F-AD24-407C-A7C9-0C7BE1B5ADD8}" destId="{F68DCE02-BC18-46D9-B58F-907CB86B59AB}" srcOrd="0" destOrd="0" parTransId="{E7AEAEFC-2709-4038-9015-B37B43827646}" sibTransId="{50D86349-7B8E-4400-8A49-641692555B5C}"/>
     <dgm:cxn modelId="{3D44210E-34BB-45CA-8DF3-7DA96D578D1E}" srcId="{3A48E02F-AD24-407C-A7C9-0C7BE1B5ADD8}" destId="{55A82723-B62F-4479-9A20-F8CB5925C6A9}" srcOrd="3" destOrd="0" parTransId="{9C4586ED-3C7E-4235-9156-A65B0091A850}" sibTransId="{5BED4A02-6FAB-4F36-96C2-EFC6F5CDDA0E}"/>
-    <dgm:cxn modelId="{BB771915-9C49-4A82-A0BF-9C2C94C9F36E}" srcId="{3A48E02F-AD24-407C-A7C9-0C7BE1B5ADD8}" destId="{035D0503-E3D9-4A65-B1BD-B6C2FEEBBF53}" srcOrd="1" destOrd="0" parTransId="{73EE19A6-1DEE-4558-A21E-CC9A8036B8F7}" sibTransId="{65DEB577-895B-4EF0-8750-630FCA2CB2EE}"/>
-    <dgm:cxn modelId="{64763728-3C46-40E7-A544-4C6A60197C7B}" type="presOf" srcId="{ECD5B12B-0838-4BFA-B6AC-66B632A0CC0F}" destId="{9E22DA28-55E1-4432-9B4E-71D9DBC68838}" srcOrd="0" destOrd="0" presId="urn:microsoft.com/office/officeart/2018/2/layout/IconVerticalSolidList"/>
-    <dgm:cxn modelId="{491A9A66-2771-4C13-BE7C-62AE3F4A63DE}" srcId="{3A48E02F-AD24-407C-A7C9-0C7BE1B5ADD8}" destId="{ECD5B12B-0838-4BFA-B6AC-66B632A0CC0F}" srcOrd="4" destOrd="0" parTransId="{B3F1D2D2-6900-4D7B-82FA-ED215ABD9761}" sibTransId="{F5BB41AA-6A32-4508-A78D-ED957AB15191}"/>
-    <dgm:cxn modelId="{D4C39974-E53F-408B-A3E6-C0B721F2D386}" srcId="{3A48E02F-AD24-407C-A7C9-0C7BE1B5ADD8}" destId="{F68DCE02-BC18-46D9-B58F-907CB86B59AB}" srcOrd="0" destOrd="0" parTransId="{E7AEAEFC-2709-4038-9015-B37B43827646}" sibTransId="{50D86349-7B8E-4400-8A49-641692555B5C}"/>
-    <dgm:cxn modelId="{8FA1AD88-7981-417E-AFDE-A146CBD28E01}" type="presOf" srcId="{3A48E02F-AD24-407C-A7C9-0C7BE1B5ADD8}" destId="{7124F8D1-E8F4-4AE2-A5BB-4F7B6078CE41}" srcOrd="0" destOrd="0" presId="urn:microsoft.com/office/officeart/2018/2/layout/IconVerticalSolidList"/>
-    <dgm:cxn modelId="{A6F5C39B-CCAC-44BD-9156-EA9DC0C6CE8F}" type="presOf" srcId="{035D0503-E3D9-4A65-B1BD-B6C2FEEBBF53}" destId="{5500A5F9-48A6-4483-997D-1CBE7AD8CD35}" srcOrd="0" destOrd="0" presId="urn:microsoft.com/office/officeart/2018/2/layout/IconVerticalSolidList"/>
-    <dgm:cxn modelId="{F97F30B9-51FE-465A-9CD2-DB6E98366AEF}" type="presOf" srcId="{F68DCE02-BC18-46D9-B58F-907CB86B59AB}" destId="{25398577-2BAF-451D-914E-7493361A9090}" srcOrd="0" destOrd="0" presId="urn:microsoft.com/office/officeart/2018/2/layout/IconVerticalSolidList"/>
-    <dgm:cxn modelId="{2E172BBA-EEEA-41CD-8212-D3292D511080}" srcId="{3A48E02F-AD24-407C-A7C9-0C7BE1B5ADD8}" destId="{A16B1EB1-9F24-4976-9F9A-E049E2DF63E5}" srcOrd="5" destOrd="0" parTransId="{EB7AEA7B-0ACD-4FBA-B0A8-E6ADF59F0D6A}" sibTransId="{72758E6A-0B87-4F17-9ACE-6D21E39A5B70}"/>
-    <dgm:cxn modelId="{A11763C8-4EB9-4433-BC15-07F541E8781D}" type="presOf" srcId="{A16B1EB1-9F24-4976-9F9A-E049E2DF63E5}" destId="{D15FFAA8-50FE-4CE4-AF35-6286C3DBADCB}" srcOrd="0" destOrd="0" presId="urn:microsoft.com/office/officeart/2018/2/layout/IconVerticalSolidList"/>
-    <dgm:cxn modelId="{FD8A61CC-FA28-4681-8A98-E5C7D08C50E2}" srcId="{3A48E02F-AD24-407C-A7C9-0C7BE1B5ADD8}" destId="{7E023733-9223-4B9E-93DB-7D28491644B2}" srcOrd="2" destOrd="0" parTransId="{E6BB0F8D-5BC5-46F6-A280-D97EEC647EDE}" sibTransId="{19F4D66C-7B1B-4515-8BBA-890C8B5F0E39}"/>
-    <dgm:cxn modelId="{38D6DFE4-2569-46F1-ADB6-F574ADC0C6D9}" type="presOf" srcId="{55A82723-B62F-4479-9A20-F8CB5925C6A9}" destId="{761C0F73-DBB3-49A6-828D-807E2E405800}" srcOrd="0" destOrd="0" presId="urn:microsoft.com/office/officeart/2018/2/layout/IconVerticalSolidList"/>
     <dgm:cxn modelId="{14CA31EF-40E1-41BE-AABF-CE0AA788C120}" type="presOf" srcId="{7E023733-9223-4B9E-93DB-7D28491644B2}" destId="{36AC7DC7-BB8D-4929-AB25-069E901EC5BC}" srcOrd="0" destOrd="0" presId="urn:microsoft.com/office/officeart/2018/2/layout/IconVerticalSolidList"/>
     <dgm:cxn modelId="{E534ED21-E565-424A-A79B-F6CA2D7B8A5D}" type="presParOf" srcId="{7124F8D1-E8F4-4AE2-A5BB-4F7B6078CE41}" destId="{F044651B-2B87-4BE0-A41E-701339B5D068}" srcOrd="0" destOrd="0" presId="urn:microsoft.com/office/officeart/2018/2/layout/IconVerticalSolidList"/>
     <dgm:cxn modelId="{09CAB8DC-7A67-4DDD-9B7E-3A4A6AFD4BF7}" type="presParOf" srcId="{F044651B-2B87-4BE0-A41E-701339B5D068}" destId="{FE25B30E-AE3C-41CD-A89B-098FC7E15F5F}" srcOrd="0" destOrd="0" presId="urn:microsoft.com/office/officeart/2018/2/layout/IconVerticalSolidList"/>
@@ -6914,6 +7073,13 @@
         </dgm:presLayoutVars>
       </dgm:prSet>
       <dgm:spPr/>
+      <dgm:t>
+        <a:bodyPr/>
+        <a:lstStyle/>
+        <a:p>
+          <a:endParaRPr lang="en-US"/>
+        </a:p>
+      </dgm:t>
     </dgm:pt>
     <dgm:pt modelId="{163C8622-5E87-4281-839B-E3CC7B1AEB23}" type="pres">
       <dgm:prSet presAssocID="{63549CD7-4CEE-41DA-8BA1-3B9DA4F335BA}" presName="parentText" presStyleLbl="node1" presStyleIdx="0" presStyleCnt="3">
@@ -6923,6 +7089,13 @@
         </dgm:presLayoutVars>
       </dgm:prSet>
       <dgm:spPr/>
+      <dgm:t>
+        <a:bodyPr/>
+        <a:lstStyle/>
+        <a:p>
+          <a:endParaRPr lang="en-US"/>
+        </a:p>
+      </dgm:t>
     </dgm:pt>
     <dgm:pt modelId="{6FBF71E0-A88F-4F88-AC96-5E4C57B9AB96}" type="pres">
       <dgm:prSet presAssocID="{97F670D3-555B-46C9-B2EC-A3E0683969D2}" presName="spacer" presStyleCnt="0"/>
@@ -6936,6 +7109,13 @@
         </dgm:presLayoutVars>
       </dgm:prSet>
       <dgm:spPr/>
+      <dgm:t>
+        <a:bodyPr/>
+        <a:lstStyle/>
+        <a:p>
+          <a:endParaRPr lang="en-US"/>
+        </a:p>
+      </dgm:t>
     </dgm:pt>
     <dgm:pt modelId="{D216D9C9-E39A-4105-AA53-FA8889937525}" type="pres">
       <dgm:prSet presAssocID="{553AD558-AB6B-40FA-B30C-CFC277D1A284}" presName="spacer" presStyleCnt="0"/>
@@ -6949,16 +7129,23 @@
         </dgm:presLayoutVars>
       </dgm:prSet>
       <dgm:spPr/>
+      <dgm:t>
+        <a:bodyPr/>
+        <a:lstStyle/>
+        <a:p>
+          <a:endParaRPr lang="en-US"/>
+        </a:p>
+      </dgm:t>
     </dgm:pt>
   </dgm:ptLst>
   <dgm:cxnLst>
+    <dgm:cxn modelId="{EAF17BD6-FB15-4357-8B08-A9C43D2224B7}" type="presOf" srcId="{A451C4F2-2474-4496-9B8E-7CD90FCA6680}" destId="{182FA360-D4DB-4F06-B2ED-D634BC3D1801}" srcOrd="0" destOrd="0" presId="urn:microsoft.com/office/officeart/2005/8/layout/vList2"/>
     <dgm:cxn modelId="{BB4F9884-D32C-4C5E-B085-7D32E54F02E9}" type="presOf" srcId="{DEECDB24-DAB4-4F8E-993E-FD54A03F4A64}" destId="{FDDA8EF0-8B74-42B4-9573-751D3F9261AB}" srcOrd="0" destOrd="0" presId="urn:microsoft.com/office/officeart/2005/8/layout/vList2"/>
+    <dgm:cxn modelId="{01CA76EB-0CC8-42FC-B1D4-BD27D0278990}" srcId="{DEECDB24-DAB4-4F8E-993E-FD54A03F4A64}" destId="{63549CD7-4CEE-41DA-8BA1-3B9DA4F335BA}" srcOrd="0" destOrd="0" parTransId="{47B9C6AE-BD39-491B-8488-3291AA289D22}" sibTransId="{97F670D3-555B-46C9-B2EC-A3E0683969D2}"/>
     <dgm:cxn modelId="{1730B293-DF09-43EA-9F5A-C627A8540156}" type="presOf" srcId="{5850D580-250C-4F56-ADD4-13934A81BC2E}" destId="{BDC33C37-AEEB-4C77-BF2D-FAF50E5C1E82}" srcOrd="0" destOrd="0" presId="urn:microsoft.com/office/officeart/2005/8/layout/vList2"/>
+    <dgm:cxn modelId="{194415D7-191C-4D9C-8F5F-817620F85972}" srcId="{DEECDB24-DAB4-4F8E-993E-FD54A03F4A64}" destId="{5850D580-250C-4F56-ADD4-13934A81BC2E}" srcOrd="2" destOrd="0" parTransId="{099A67E9-338C-4EBA-8973-C6926298AAE3}" sibTransId="{0EABB340-769D-4D10-8271-7AFD788A6E4E}"/>
+    <dgm:cxn modelId="{64A5C8ED-FC56-4063-BA66-AB8ED481B004}" type="presOf" srcId="{63549CD7-4CEE-41DA-8BA1-3B9DA4F335BA}" destId="{163C8622-5E87-4281-839B-E3CC7B1AEB23}" srcOrd="0" destOrd="0" presId="urn:microsoft.com/office/officeart/2005/8/layout/vList2"/>
     <dgm:cxn modelId="{2778B6CA-7B15-4EA9-BCC7-EA834CFEA9AC}" srcId="{DEECDB24-DAB4-4F8E-993E-FD54A03F4A64}" destId="{A451C4F2-2474-4496-9B8E-7CD90FCA6680}" srcOrd="1" destOrd="0" parTransId="{F50C73E6-C336-4616-A9A6-00A07531E2A1}" sibTransId="{553AD558-AB6B-40FA-B30C-CFC277D1A284}"/>
-    <dgm:cxn modelId="{EAF17BD6-FB15-4357-8B08-A9C43D2224B7}" type="presOf" srcId="{A451C4F2-2474-4496-9B8E-7CD90FCA6680}" destId="{182FA360-D4DB-4F06-B2ED-D634BC3D1801}" srcOrd="0" destOrd="0" presId="urn:microsoft.com/office/officeart/2005/8/layout/vList2"/>
-    <dgm:cxn modelId="{194415D7-191C-4D9C-8F5F-817620F85972}" srcId="{DEECDB24-DAB4-4F8E-993E-FD54A03F4A64}" destId="{5850D580-250C-4F56-ADD4-13934A81BC2E}" srcOrd="2" destOrd="0" parTransId="{099A67E9-338C-4EBA-8973-C6926298AAE3}" sibTransId="{0EABB340-769D-4D10-8271-7AFD788A6E4E}"/>
-    <dgm:cxn modelId="{01CA76EB-0CC8-42FC-B1D4-BD27D0278990}" srcId="{DEECDB24-DAB4-4F8E-993E-FD54A03F4A64}" destId="{63549CD7-4CEE-41DA-8BA1-3B9DA4F335BA}" srcOrd="0" destOrd="0" parTransId="{47B9C6AE-BD39-491B-8488-3291AA289D22}" sibTransId="{97F670D3-555B-46C9-B2EC-A3E0683969D2}"/>
-    <dgm:cxn modelId="{64A5C8ED-FC56-4063-BA66-AB8ED481B004}" type="presOf" srcId="{63549CD7-4CEE-41DA-8BA1-3B9DA4F335BA}" destId="{163C8622-5E87-4281-839B-E3CC7B1AEB23}" srcOrd="0" destOrd="0" presId="urn:microsoft.com/office/officeart/2005/8/layout/vList2"/>
     <dgm:cxn modelId="{AC189F9C-10DE-4EFF-BCD1-EABBD467752F}" type="presParOf" srcId="{FDDA8EF0-8B74-42B4-9573-751D3F9261AB}" destId="{163C8622-5E87-4281-839B-E3CC7B1AEB23}" srcOrd="0" destOrd="0" presId="urn:microsoft.com/office/officeart/2005/8/layout/vList2"/>
     <dgm:cxn modelId="{D853F48A-52F1-45F1-9AD5-FF6BD9C9F50D}" type="presParOf" srcId="{FDDA8EF0-8B74-42B4-9573-751D3F9261AB}" destId="{6FBF71E0-A88F-4F88-AC96-5E4C57B9AB96}" srcOrd="1" destOrd="0" presId="urn:microsoft.com/office/officeart/2005/8/layout/vList2"/>
     <dgm:cxn modelId="{9D8227DF-5231-46AC-B180-80F0FA1D2BC0}" type="presParOf" srcId="{FDDA8EF0-8B74-42B4-9573-751D3F9261AB}" destId="{182FA360-D4DB-4F06-B2ED-D634BC3D1801}" srcOrd="2" destOrd="0" presId="urn:microsoft.com/office/officeart/2005/8/layout/vList2"/>
@@ -7108,6 +7295,13 @@
         </dgm:presLayoutVars>
       </dgm:prSet>
       <dgm:spPr/>
+      <dgm:t>
+        <a:bodyPr/>
+        <a:lstStyle/>
+        <a:p>
+          <a:endParaRPr lang="en-US"/>
+        </a:p>
+      </dgm:t>
     </dgm:pt>
     <dgm:pt modelId="{80114F40-BA51-467A-B418-7DCEE2E50A3C}" type="pres">
       <dgm:prSet presAssocID="{44C3D624-0A98-49FD-B463-17F1B984D3A3}" presName="parentText" presStyleLbl="node1" presStyleIdx="0" presStyleCnt="3">
@@ -7117,6 +7311,13 @@
         </dgm:presLayoutVars>
       </dgm:prSet>
       <dgm:spPr/>
+      <dgm:t>
+        <a:bodyPr/>
+        <a:lstStyle/>
+        <a:p>
+          <a:endParaRPr lang="en-US"/>
+        </a:p>
+      </dgm:t>
     </dgm:pt>
     <dgm:pt modelId="{58471153-4288-49C7-B011-A33DBC715850}" type="pres">
       <dgm:prSet presAssocID="{B896493C-40F1-4B5B-B291-DA3B2B934C3C}" presName="spacer" presStyleCnt="0"/>
@@ -7130,6 +7331,13 @@
         </dgm:presLayoutVars>
       </dgm:prSet>
       <dgm:spPr/>
+      <dgm:t>
+        <a:bodyPr/>
+        <a:lstStyle/>
+        <a:p>
+          <a:endParaRPr lang="en-US"/>
+        </a:p>
+      </dgm:t>
     </dgm:pt>
     <dgm:pt modelId="{CB9EF5EC-15C3-4CD9-BB2A-85695E86138C}" type="pres">
       <dgm:prSet presAssocID="{B94A4746-08BA-4477-9932-A37C0161C62F}" presName="spacer" presStyleCnt="0"/>
@@ -7143,16 +7351,23 @@
         </dgm:presLayoutVars>
       </dgm:prSet>
       <dgm:spPr/>
+      <dgm:t>
+        <a:bodyPr/>
+        <a:lstStyle/>
+        <a:p>
+          <a:endParaRPr lang="en-US"/>
+        </a:p>
+      </dgm:t>
     </dgm:pt>
   </dgm:ptLst>
   <dgm:cxnLst>
     <dgm:cxn modelId="{E2690108-0A4F-47D6-B10D-5D4EB4BBFF48}" type="presOf" srcId="{2812CE74-2A20-42D1-BF03-632B8D3EB26A}" destId="{0C858792-8F5C-44DC-BD35-B98054018FE9}" srcOrd="0" destOrd="0" presId="urn:microsoft.com/office/officeart/2005/8/layout/vList2"/>
+    <dgm:cxn modelId="{AD390158-2782-4A8A-93FC-E5A9FC64BC22}" type="presOf" srcId="{19DE4CBC-40A4-472F-A5BC-02B3E39EAFFD}" destId="{3563BE3E-BB77-4B3E-986B-A574D9302EF3}" srcOrd="0" destOrd="0" presId="urn:microsoft.com/office/officeart/2005/8/layout/vList2"/>
+    <dgm:cxn modelId="{D5424248-EAD8-479D-88F2-B12C9905CA58}" srcId="{3C8E4112-3E9E-46E6-A45E-47D53458C3FA}" destId="{19DE4CBC-40A4-472F-A5BC-02B3E39EAFFD}" srcOrd="2" destOrd="0" parTransId="{7D6446BD-0B62-4CBE-986F-E5A01DA901E0}" sibTransId="{D9B39D5B-01F2-41EA-BD96-0394D3CD858E}"/>
+    <dgm:cxn modelId="{643EA89E-2687-4942-BC61-C48371B82A7C}" srcId="{3C8E4112-3E9E-46E6-A45E-47D53458C3FA}" destId="{2812CE74-2A20-42D1-BF03-632B8D3EB26A}" srcOrd="1" destOrd="0" parTransId="{56D8AA7E-4E27-4F32-9C08-E51BCE9AA97A}" sibTransId="{B94A4746-08BA-4477-9932-A37C0161C62F}"/>
+    <dgm:cxn modelId="{A89B9BF3-F1AC-4774-993C-91F77D4C41A8}" type="presOf" srcId="{44C3D624-0A98-49FD-B463-17F1B984D3A3}" destId="{80114F40-BA51-467A-B418-7DCEE2E50A3C}" srcOrd="0" destOrd="0" presId="urn:microsoft.com/office/officeart/2005/8/layout/vList2"/>
     <dgm:cxn modelId="{BA0F2616-94EF-45E5-B376-F1C3DB3A826D}" srcId="{3C8E4112-3E9E-46E6-A45E-47D53458C3FA}" destId="{44C3D624-0A98-49FD-B463-17F1B984D3A3}" srcOrd="0" destOrd="0" parTransId="{4073CAA8-76E6-478D-BC97-A11482AA6D7F}" sibTransId="{B896493C-40F1-4B5B-B291-DA3B2B934C3C}"/>
     <dgm:cxn modelId="{3C00C33E-45C6-4679-98B0-A88E7E5ECB7A}" type="presOf" srcId="{3C8E4112-3E9E-46E6-A45E-47D53458C3FA}" destId="{36510190-5CEB-4B86-BC4F-A033E93A6A74}" srcOrd="0" destOrd="0" presId="urn:microsoft.com/office/officeart/2005/8/layout/vList2"/>
-    <dgm:cxn modelId="{D5424248-EAD8-479D-88F2-B12C9905CA58}" srcId="{3C8E4112-3E9E-46E6-A45E-47D53458C3FA}" destId="{19DE4CBC-40A4-472F-A5BC-02B3E39EAFFD}" srcOrd="2" destOrd="0" parTransId="{7D6446BD-0B62-4CBE-986F-E5A01DA901E0}" sibTransId="{D9B39D5B-01F2-41EA-BD96-0394D3CD858E}"/>
-    <dgm:cxn modelId="{AD390158-2782-4A8A-93FC-E5A9FC64BC22}" type="presOf" srcId="{19DE4CBC-40A4-472F-A5BC-02B3E39EAFFD}" destId="{3563BE3E-BB77-4B3E-986B-A574D9302EF3}" srcOrd="0" destOrd="0" presId="urn:microsoft.com/office/officeart/2005/8/layout/vList2"/>
-    <dgm:cxn modelId="{643EA89E-2687-4942-BC61-C48371B82A7C}" srcId="{3C8E4112-3E9E-46E6-A45E-47D53458C3FA}" destId="{2812CE74-2A20-42D1-BF03-632B8D3EB26A}" srcOrd="1" destOrd="0" parTransId="{56D8AA7E-4E27-4F32-9C08-E51BCE9AA97A}" sibTransId="{B94A4746-08BA-4477-9932-A37C0161C62F}"/>
-    <dgm:cxn modelId="{A89B9BF3-F1AC-4774-993C-91F77D4C41A8}" type="presOf" srcId="{44C3D624-0A98-49FD-B463-17F1B984D3A3}" destId="{80114F40-BA51-467A-B418-7DCEE2E50A3C}" srcOrd="0" destOrd="0" presId="urn:microsoft.com/office/officeart/2005/8/layout/vList2"/>
     <dgm:cxn modelId="{1D78086C-E2FF-4C06-BC25-F296933CF538}" type="presParOf" srcId="{36510190-5CEB-4B86-BC4F-A033E93A6A74}" destId="{80114F40-BA51-467A-B418-7DCEE2E50A3C}" srcOrd="0" destOrd="0" presId="urn:microsoft.com/office/officeart/2005/8/layout/vList2"/>
     <dgm:cxn modelId="{AF881B98-1756-40FC-B13D-140FB873F772}" type="presParOf" srcId="{36510190-5CEB-4B86-BC4F-A033E93A6A74}" destId="{58471153-4288-49C7-B011-A33DBC715850}" srcOrd="1" destOrd="0" presId="urn:microsoft.com/office/officeart/2005/8/layout/vList2"/>
     <dgm:cxn modelId="{F83ACBC0-4102-4F83-9AEA-F05B8A11C309}" type="presParOf" srcId="{36510190-5CEB-4B86-BC4F-A033E93A6A74}" destId="{0C858792-8F5C-44DC-BD35-B98054018FE9}" srcOrd="2" destOrd="0" presId="urn:microsoft.com/office/officeart/2005/8/layout/vList2"/>
@@ -7339,6 +7554,13 @@
         </dgm:presLayoutVars>
       </dgm:prSet>
       <dgm:spPr/>
+      <dgm:t>
+        <a:bodyPr/>
+        <a:lstStyle/>
+        <a:p>
+          <a:endParaRPr lang="en-US"/>
+        </a:p>
+      </dgm:t>
     </dgm:pt>
     <dgm:pt modelId="{6F047A09-F6DE-4B1A-8FEB-337762900D95}" type="pres">
       <dgm:prSet presAssocID="{76AEDFEA-BEF0-4FE6-8C59-CB92DCE46C65}" presName="parentText" presStyleLbl="node1" presStyleIdx="0" presStyleCnt="4">
@@ -7348,6 +7570,13 @@
         </dgm:presLayoutVars>
       </dgm:prSet>
       <dgm:spPr/>
+      <dgm:t>
+        <a:bodyPr/>
+        <a:lstStyle/>
+        <a:p>
+          <a:endParaRPr lang="en-US"/>
+        </a:p>
+      </dgm:t>
     </dgm:pt>
     <dgm:pt modelId="{9273CB4A-6970-411A-AAD0-B51C14FD8951}" type="pres">
       <dgm:prSet presAssocID="{3550D0B2-3300-4609-A6AF-A48242A8CD52}" presName="spacer" presStyleCnt="0"/>
@@ -7361,6 +7590,13 @@
         </dgm:presLayoutVars>
       </dgm:prSet>
       <dgm:spPr/>
+      <dgm:t>
+        <a:bodyPr/>
+        <a:lstStyle/>
+        <a:p>
+          <a:endParaRPr lang="en-US"/>
+        </a:p>
+      </dgm:t>
     </dgm:pt>
     <dgm:pt modelId="{4A8FD6B5-84E2-4701-AAE8-D73EF43EBBAB}" type="pres">
       <dgm:prSet presAssocID="{BE069F86-CC70-437C-89ED-0E69D2D6911A}" presName="spacer" presStyleCnt="0"/>
@@ -7374,6 +7610,13 @@
         </dgm:presLayoutVars>
       </dgm:prSet>
       <dgm:spPr/>
+      <dgm:t>
+        <a:bodyPr/>
+        <a:lstStyle/>
+        <a:p>
+          <a:endParaRPr lang="en-US"/>
+        </a:p>
+      </dgm:t>
     </dgm:pt>
     <dgm:pt modelId="{1EA7313B-B8CE-4D4B-B198-DE5701330328}" type="pres">
       <dgm:prSet presAssocID="{5EA554EA-E8C2-4076-903C-F7769D7CE6CA}" presName="spacer" presStyleCnt="0"/>
@@ -7387,18 +7630,25 @@
         </dgm:presLayoutVars>
       </dgm:prSet>
       <dgm:spPr/>
+      <dgm:t>
+        <a:bodyPr/>
+        <a:lstStyle/>
+        <a:p>
+          <a:endParaRPr lang="en-US"/>
+        </a:p>
+      </dgm:t>
     </dgm:pt>
   </dgm:ptLst>
   <dgm:cxnLst>
     <dgm:cxn modelId="{8EC22204-D339-4ED4-BBB3-C73899E0C8DF}" type="presOf" srcId="{8040CE40-AF84-47EA-AC8F-B53FF92F06D1}" destId="{1EC8D7B1-C4AB-4DA5-B535-09051DA60E6D}" srcOrd="0" destOrd="0" presId="urn:microsoft.com/office/officeart/2005/8/layout/vList2"/>
+    <dgm:cxn modelId="{C3549D30-2A70-4117-92A3-413AEAD9662A}" type="presOf" srcId="{E2E67C8D-A0BD-40FF-AFE8-489C50975B13}" destId="{BE54303F-3232-4644-BFC7-4E5A75ED2A7A}" srcOrd="0" destOrd="0" presId="urn:microsoft.com/office/officeart/2005/8/layout/vList2"/>
+    <dgm:cxn modelId="{F4FBDA18-D9BC-4874-94DF-BC537B7AAD6F}" type="presOf" srcId="{FB8F3B4C-7BDA-4087-AA6C-903CF87B0A8A}" destId="{A7B5275E-C7AC-415F-8970-857A77EA8DC4}" srcOrd="0" destOrd="0" presId="urn:microsoft.com/office/officeart/2005/8/layout/vList2"/>
     <dgm:cxn modelId="{BF30C217-9E0D-4223-8DC8-C55C007B7DE6}" type="presOf" srcId="{76AEDFEA-BEF0-4FE6-8C59-CB92DCE46C65}" destId="{6F047A09-F6DE-4B1A-8FEB-337762900D95}" srcOrd="0" destOrd="0" presId="urn:microsoft.com/office/officeart/2005/8/layout/vList2"/>
-    <dgm:cxn modelId="{F4FBDA18-D9BC-4874-94DF-BC537B7AAD6F}" type="presOf" srcId="{FB8F3B4C-7BDA-4087-AA6C-903CF87B0A8A}" destId="{A7B5275E-C7AC-415F-8970-857A77EA8DC4}" srcOrd="0" destOrd="0" presId="urn:microsoft.com/office/officeart/2005/8/layout/vList2"/>
-    <dgm:cxn modelId="{C3549D30-2A70-4117-92A3-413AEAD9662A}" type="presOf" srcId="{E2E67C8D-A0BD-40FF-AFE8-489C50975B13}" destId="{BE54303F-3232-4644-BFC7-4E5A75ED2A7A}" srcOrd="0" destOrd="0" presId="urn:microsoft.com/office/officeart/2005/8/layout/vList2"/>
+    <dgm:cxn modelId="{5D8F5797-5D69-428F-9481-51B30303EA39}" srcId="{8040CE40-AF84-47EA-AC8F-B53FF92F06D1}" destId="{FB8F3B4C-7BDA-4087-AA6C-903CF87B0A8A}" srcOrd="2" destOrd="0" parTransId="{62B2F782-0C70-4685-8CB3-53B865AAF5FC}" sibTransId="{5EA554EA-E8C2-4076-903C-F7769D7CE6CA}"/>
+    <dgm:cxn modelId="{EB65C0A6-08A4-4A74-ABBE-E8DB2EF7E805}" type="presOf" srcId="{EF630A90-44F3-49EA-82CA-EF2CBC236609}" destId="{B63717B0-C7C3-400D-9FBD-52628D3DCEB7}" srcOrd="0" destOrd="0" presId="urn:microsoft.com/office/officeart/2005/8/layout/vList2"/>
     <dgm:cxn modelId="{3DF59964-40E8-4050-A601-88C8370BCAC9}" srcId="{8040CE40-AF84-47EA-AC8F-B53FF92F06D1}" destId="{EF630A90-44F3-49EA-82CA-EF2CBC236609}" srcOrd="1" destOrd="0" parTransId="{A7C2C8CE-22B9-499C-94BE-2986B9D647BE}" sibTransId="{BE069F86-CC70-437C-89ED-0E69D2D6911A}"/>
+    <dgm:cxn modelId="{4F5F46A4-5AB0-4DC4-BF5E-6CEA1363621F}" srcId="{8040CE40-AF84-47EA-AC8F-B53FF92F06D1}" destId="{E2E67C8D-A0BD-40FF-AFE8-489C50975B13}" srcOrd="3" destOrd="0" parTransId="{DF974255-3F8F-4B6E-A5B8-FE635AB90FDE}" sibTransId="{90AF1C8D-0881-4D58-A420-AFE95B20977D}"/>
     <dgm:cxn modelId="{3777657A-296E-4AAA-8707-1EF3D1D966E1}" srcId="{8040CE40-AF84-47EA-AC8F-B53FF92F06D1}" destId="{76AEDFEA-BEF0-4FE6-8C59-CB92DCE46C65}" srcOrd="0" destOrd="0" parTransId="{97952AA4-0067-42A0-A4D0-80ED06A3B94A}" sibTransId="{3550D0B2-3300-4609-A6AF-A48242A8CD52}"/>
-    <dgm:cxn modelId="{5D8F5797-5D69-428F-9481-51B30303EA39}" srcId="{8040CE40-AF84-47EA-AC8F-B53FF92F06D1}" destId="{FB8F3B4C-7BDA-4087-AA6C-903CF87B0A8A}" srcOrd="2" destOrd="0" parTransId="{62B2F782-0C70-4685-8CB3-53B865AAF5FC}" sibTransId="{5EA554EA-E8C2-4076-903C-F7769D7CE6CA}"/>
-    <dgm:cxn modelId="{4F5F46A4-5AB0-4DC4-BF5E-6CEA1363621F}" srcId="{8040CE40-AF84-47EA-AC8F-B53FF92F06D1}" destId="{E2E67C8D-A0BD-40FF-AFE8-489C50975B13}" srcOrd="3" destOrd="0" parTransId="{DF974255-3F8F-4B6E-A5B8-FE635AB90FDE}" sibTransId="{90AF1C8D-0881-4D58-A420-AFE95B20977D}"/>
-    <dgm:cxn modelId="{EB65C0A6-08A4-4A74-ABBE-E8DB2EF7E805}" type="presOf" srcId="{EF630A90-44F3-49EA-82CA-EF2CBC236609}" destId="{B63717B0-C7C3-400D-9FBD-52628D3DCEB7}" srcOrd="0" destOrd="0" presId="urn:microsoft.com/office/officeart/2005/8/layout/vList2"/>
     <dgm:cxn modelId="{C9E144EC-F1B4-426C-969F-4DD959D6BFA9}" type="presParOf" srcId="{1EC8D7B1-C4AB-4DA5-B535-09051DA60E6D}" destId="{6F047A09-F6DE-4B1A-8FEB-337762900D95}" srcOrd="0" destOrd="0" presId="urn:microsoft.com/office/officeart/2005/8/layout/vList2"/>
     <dgm:cxn modelId="{238C1A7F-7178-407E-9B6E-1695DD2FBA22}" type="presParOf" srcId="{1EC8D7B1-C4AB-4DA5-B535-09051DA60E6D}" destId="{9273CB4A-6970-411A-AAD0-B51C14FD8951}" srcOrd="1" destOrd="0" presId="urn:microsoft.com/office/officeart/2005/8/layout/vList2"/>
     <dgm:cxn modelId="{C7DB8D41-FED9-45A5-A3B3-C6E2A0D32B93}" type="presParOf" srcId="{1EC8D7B1-C4AB-4DA5-B535-09051DA60E6D}" destId="{B63717B0-C7C3-400D-9FBD-52628D3DCEB7}" srcOrd="2" destOrd="0" presId="urn:microsoft.com/office/officeart/2005/8/layout/vList2"/>
@@ -7587,6 +7837,13 @@
         </dgm:presLayoutVars>
       </dgm:prSet>
       <dgm:spPr/>
+      <dgm:t>
+        <a:bodyPr/>
+        <a:lstStyle/>
+        <a:p>
+          <a:endParaRPr lang="en-US"/>
+        </a:p>
+      </dgm:t>
     </dgm:pt>
     <dgm:pt modelId="{21D9BD75-A2BB-4156-9214-B6715EF17573}" type="pres">
       <dgm:prSet presAssocID="{8DB33692-3DFC-43BA-A4EA-A80A7CA93C92}" presName="parentText" presStyleLbl="node1" presStyleIdx="0" presStyleCnt="4">
@@ -7596,6 +7853,13 @@
         </dgm:presLayoutVars>
       </dgm:prSet>
       <dgm:spPr/>
+      <dgm:t>
+        <a:bodyPr/>
+        <a:lstStyle/>
+        <a:p>
+          <a:endParaRPr lang="en-US"/>
+        </a:p>
+      </dgm:t>
     </dgm:pt>
     <dgm:pt modelId="{445C9485-FC10-421B-B74F-C4A2241A7993}" type="pres">
       <dgm:prSet presAssocID="{2717C88B-4E8A-47FC-8943-A273B4B6D4F7}" presName="spacer" presStyleCnt="0"/>
@@ -7609,6 +7873,13 @@
         </dgm:presLayoutVars>
       </dgm:prSet>
       <dgm:spPr/>
+      <dgm:t>
+        <a:bodyPr/>
+        <a:lstStyle/>
+        <a:p>
+          <a:endParaRPr lang="en-US"/>
+        </a:p>
+      </dgm:t>
     </dgm:pt>
     <dgm:pt modelId="{1A468405-898B-4512-BA7C-600F9D5DA38D}" type="pres">
       <dgm:prSet presAssocID="{676159C2-E21A-4984-912C-B7BDC984454F}" presName="spacer" presStyleCnt="0"/>
@@ -7622,6 +7893,13 @@
         </dgm:presLayoutVars>
       </dgm:prSet>
       <dgm:spPr/>
+      <dgm:t>
+        <a:bodyPr/>
+        <a:lstStyle/>
+        <a:p>
+          <a:endParaRPr lang="en-US"/>
+        </a:p>
+      </dgm:t>
     </dgm:pt>
     <dgm:pt modelId="{AB8F013E-B125-4C36-A6D0-80690DB70D6E}" type="pres">
       <dgm:prSet presAssocID="{0D2B75D2-48E9-4FE9-9F83-946A1795DE23}" presName="spacer" presStyleCnt="0"/>
@@ -7635,18 +7913,25 @@
         </dgm:presLayoutVars>
       </dgm:prSet>
       <dgm:spPr/>
+      <dgm:t>
+        <a:bodyPr/>
+        <a:lstStyle/>
+        <a:p>
+          <a:endParaRPr lang="en-US"/>
+        </a:p>
+      </dgm:t>
     </dgm:pt>
   </dgm:ptLst>
   <dgm:cxnLst>
+    <dgm:cxn modelId="{ECA80851-D456-4641-B300-9723141E5881}" type="presOf" srcId="{87F456D1-FD27-47D5-BCEF-6D5FCD10440C}" destId="{EE8B9CCE-7D32-442B-98E4-941723DF576E}" srcOrd="0" destOrd="0" presId="urn:microsoft.com/office/officeart/2005/8/layout/vList2"/>
+    <dgm:cxn modelId="{7E48EFD4-5A4B-4B62-BAEA-65E6542B61B6}" srcId="{AA0B2910-8B85-4392-A303-A37F1D915EF9}" destId="{DE76D976-2C3B-430C-BB55-08CA5E58A06C}" srcOrd="1" destOrd="0" parTransId="{6936AF9C-DF84-40EB-9A7D-7F5BB1716D12}" sibTransId="{676159C2-E21A-4984-912C-B7BDC984454F}"/>
+    <dgm:cxn modelId="{1FD229E0-EC09-4A33-8A64-CE5D77565F58}" type="presOf" srcId="{8DB33692-3DFC-43BA-A4EA-A80A7CA93C92}" destId="{21D9BD75-A2BB-4156-9214-B6715EF17573}" srcOrd="0" destOrd="0" presId="urn:microsoft.com/office/officeart/2005/8/layout/vList2"/>
     <dgm:cxn modelId="{63B52409-880C-425C-9D5A-9B3C955FC39E}" srcId="{AA0B2910-8B85-4392-A303-A37F1D915EF9}" destId="{87F456D1-FD27-47D5-BCEF-6D5FCD10440C}" srcOrd="2" destOrd="0" parTransId="{F689F157-5C97-4067-A92A-E3E89AB47514}" sibTransId="{0D2B75D2-48E9-4FE9-9F83-946A1795DE23}"/>
-    <dgm:cxn modelId="{ECA80851-D456-4641-B300-9723141E5881}" type="presOf" srcId="{87F456D1-FD27-47D5-BCEF-6D5FCD10440C}" destId="{EE8B9CCE-7D32-442B-98E4-941723DF576E}" srcOrd="0" destOrd="0" presId="urn:microsoft.com/office/officeart/2005/8/layout/vList2"/>
+    <dgm:cxn modelId="{BD3D0895-5873-4509-8799-4070050E9F7A}" type="presOf" srcId="{AA0B2910-8B85-4392-A303-A37F1D915EF9}" destId="{992FB0A7-72B0-42D8-95E3-3A7B0D0B6936}" srcOrd="0" destOrd="0" presId="urn:microsoft.com/office/officeart/2005/8/layout/vList2"/>
+    <dgm:cxn modelId="{FBA2089D-CB7E-4DD0-9F3C-6C0410F14909}" srcId="{AA0B2910-8B85-4392-A303-A37F1D915EF9}" destId="{8DB33692-3DFC-43BA-A4EA-A80A7CA93C92}" srcOrd="0" destOrd="0" parTransId="{D22D5564-1DE8-49D0-B628-C5CF44DA7A19}" sibTransId="{2717C88B-4E8A-47FC-8943-A273B4B6D4F7}"/>
     <dgm:cxn modelId="{4E14F351-E8DC-4A16-A570-C4DAB96C24F2}" srcId="{AA0B2910-8B85-4392-A303-A37F1D915EF9}" destId="{73E10118-D121-41E0-B3B1-CAFAB74AAFE8}" srcOrd="3" destOrd="0" parTransId="{1C6097B9-C384-44C3-8B6E-85E57665C6D0}" sibTransId="{93F75CD6-BB24-4030-BCF8-73FB63D41DDA}"/>
     <dgm:cxn modelId="{70C5C073-924B-4A64-8ED9-3CC89330AB8C}" type="presOf" srcId="{73E10118-D121-41E0-B3B1-CAFAB74AAFE8}" destId="{FB1B66AE-B06C-4ECC-83E2-A9E0F9B5B6D9}" srcOrd="0" destOrd="0" presId="urn:microsoft.com/office/officeart/2005/8/layout/vList2"/>
-    <dgm:cxn modelId="{BD3D0895-5873-4509-8799-4070050E9F7A}" type="presOf" srcId="{AA0B2910-8B85-4392-A303-A37F1D915EF9}" destId="{992FB0A7-72B0-42D8-95E3-3A7B0D0B6936}" srcOrd="0" destOrd="0" presId="urn:microsoft.com/office/officeart/2005/8/layout/vList2"/>
-    <dgm:cxn modelId="{FBA2089D-CB7E-4DD0-9F3C-6C0410F14909}" srcId="{AA0B2910-8B85-4392-A303-A37F1D915EF9}" destId="{8DB33692-3DFC-43BA-A4EA-A80A7CA93C92}" srcOrd="0" destOrd="0" parTransId="{D22D5564-1DE8-49D0-B628-C5CF44DA7A19}" sibTransId="{2717C88B-4E8A-47FC-8943-A273B4B6D4F7}"/>
     <dgm:cxn modelId="{12DCA2A9-2D06-4BAD-A0E2-8C41141679D7}" type="presOf" srcId="{DE76D976-2C3B-430C-BB55-08CA5E58A06C}" destId="{8EFCE7D7-436A-4DAF-A300-08DC4B0102CC}" srcOrd="0" destOrd="0" presId="urn:microsoft.com/office/officeart/2005/8/layout/vList2"/>
-    <dgm:cxn modelId="{7E48EFD4-5A4B-4B62-BAEA-65E6542B61B6}" srcId="{AA0B2910-8B85-4392-A303-A37F1D915EF9}" destId="{DE76D976-2C3B-430C-BB55-08CA5E58A06C}" srcOrd="1" destOrd="0" parTransId="{6936AF9C-DF84-40EB-9A7D-7F5BB1716D12}" sibTransId="{676159C2-E21A-4984-912C-B7BDC984454F}"/>
-    <dgm:cxn modelId="{1FD229E0-EC09-4A33-8A64-CE5D77565F58}" type="presOf" srcId="{8DB33692-3DFC-43BA-A4EA-A80A7CA93C92}" destId="{21D9BD75-A2BB-4156-9214-B6715EF17573}" srcOrd="0" destOrd="0" presId="urn:microsoft.com/office/officeart/2005/8/layout/vList2"/>
     <dgm:cxn modelId="{2EE68222-1916-46C3-9DB6-0472BB788863}" type="presParOf" srcId="{992FB0A7-72B0-42D8-95E3-3A7B0D0B6936}" destId="{21D9BD75-A2BB-4156-9214-B6715EF17573}" srcOrd="0" destOrd="0" presId="urn:microsoft.com/office/officeart/2005/8/layout/vList2"/>
     <dgm:cxn modelId="{4EC17FF0-8EFF-421D-9529-45638BA6A658}" type="presParOf" srcId="{992FB0A7-72B0-42D8-95E3-3A7B0D0B6936}" destId="{445C9485-FC10-421B-B74F-C4A2241A7993}" srcOrd="1" destOrd="0" presId="urn:microsoft.com/office/officeart/2005/8/layout/vList2"/>
     <dgm:cxn modelId="{268EF427-80EC-4C1B-AE95-02CD3A2F58BA}" type="presParOf" srcId="{992FB0A7-72B0-42D8-95E3-3A7B0D0B6936}" destId="{8EFCE7D7-436A-4DAF-A300-08DC4B0102CC}" srcOrd="2" destOrd="0" presId="urn:microsoft.com/office/officeart/2005/8/layout/vList2"/>
@@ -7798,6 +8083,13 @@
         </dgm:presLayoutVars>
       </dgm:prSet>
       <dgm:spPr/>
+      <dgm:t>
+        <a:bodyPr/>
+        <a:lstStyle/>
+        <a:p>
+          <a:endParaRPr lang="en-US"/>
+        </a:p>
+      </dgm:t>
     </dgm:pt>
     <dgm:pt modelId="{027C34B1-0C9E-47AB-9411-6B3BF5AF8157}" type="pres">
       <dgm:prSet presAssocID="{3DC1EE45-D6BC-49E9-A088-F619C40C8937}" presName="parentText" presStyleLbl="node1" presStyleIdx="0" presStyleCnt="3">
@@ -7807,6 +8099,13 @@
         </dgm:presLayoutVars>
       </dgm:prSet>
       <dgm:spPr/>
+      <dgm:t>
+        <a:bodyPr/>
+        <a:lstStyle/>
+        <a:p>
+          <a:endParaRPr lang="en-US"/>
+        </a:p>
+      </dgm:t>
     </dgm:pt>
     <dgm:pt modelId="{47D8A9D4-A50B-4F0C-B6B5-9B933D633038}" type="pres">
       <dgm:prSet presAssocID="{B3F08D45-4D63-4525-B438-5DEF32EE930A}" presName="spacer" presStyleCnt="0"/>
@@ -7820,6 +8119,13 @@
         </dgm:presLayoutVars>
       </dgm:prSet>
       <dgm:spPr/>
+      <dgm:t>
+        <a:bodyPr/>
+        <a:lstStyle/>
+        <a:p>
+          <a:endParaRPr lang="en-US"/>
+        </a:p>
+      </dgm:t>
     </dgm:pt>
     <dgm:pt modelId="{54B31E39-0656-41E9-96A3-36F331E62E4C}" type="pres">
       <dgm:prSet presAssocID="{6BD1F31A-65E9-4971-A032-3F7CF03BC94F}" presName="spacer" presStyleCnt="0"/>
@@ -7833,16 +8139,23 @@
         </dgm:presLayoutVars>
       </dgm:prSet>
       <dgm:spPr/>
+      <dgm:t>
+        <a:bodyPr/>
+        <a:lstStyle/>
+        <a:p>
+          <a:endParaRPr lang="en-US"/>
+        </a:p>
+      </dgm:t>
     </dgm:pt>
   </dgm:ptLst>
   <dgm:cxnLst>
+    <dgm:cxn modelId="{E6CE45E4-4CA9-4401-AA67-838FB27B2BEF}" srcId="{8A66127B-8701-437B-8916-9906DC5501DC}" destId="{DB226214-406E-4ADF-8EA6-8FBDEFBCB602}" srcOrd="2" destOrd="0" parTransId="{99A85BB0-D30F-4B02-89AC-22F61488CA90}" sibTransId="{28FBBA63-11A2-4229-B6AE-D92BAE56AE3F}"/>
     <dgm:cxn modelId="{77BA3107-1942-4E2F-9D56-5690765F0E2D}" srcId="{8A66127B-8701-437B-8916-9906DC5501DC}" destId="{3DC1EE45-D6BC-49E9-A088-F619C40C8937}" srcOrd="0" destOrd="0" parTransId="{9B573E97-A92C-4FB5-8D35-DC622D2EED02}" sibTransId="{B3F08D45-4D63-4525-B438-5DEF32EE930A}"/>
+    <dgm:cxn modelId="{8934BBD4-166E-48ED-88C3-C3AAFA9517BA}" type="presOf" srcId="{DE329CAE-97B2-47BF-81D4-456AD1EFC57C}" destId="{D2ADFF34-4251-41E1-8037-25AD6CB395A5}" srcOrd="0" destOrd="0" presId="urn:microsoft.com/office/officeart/2005/8/layout/vList2"/>
     <dgm:cxn modelId="{49C57A60-335F-4B55-A6A5-E449B467FE95}" type="presOf" srcId="{8A66127B-8701-437B-8916-9906DC5501DC}" destId="{B286A3B5-B73B-43FF-8283-84CFE32D6629}" srcOrd="0" destOrd="0" presId="urn:microsoft.com/office/officeart/2005/8/layout/vList2"/>
     <dgm:cxn modelId="{AE1AD949-924F-4C7B-BEBD-561A56C117F4}" type="presOf" srcId="{DB226214-406E-4ADF-8EA6-8FBDEFBCB602}" destId="{21E56E4C-418A-419A-8362-FCD5F693129B}" srcOrd="0" destOrd="0" presId="urn:microsoft.com/office/officeart/2005/8/layout/vList2"/>
+    <dgm:cxn modelId="{EF70C8A4-0222-41CB-8170-CB62D2D73FEC}" type="presOf" srcId="{3DC1EE45-D6BC-49E9-A088-F619C40C8937}" destId="{027C34B1-0C9E-47AB-9411-6B3BF5AF8157}" srcOrd="0" destOrd="0" presId="urn:microsoft.com/office/officeart/2005/8/layout/vList2"/>
     <dgm:cxn modelId="{AE22A487-2F7F-4866-92FA-C0D531809D1A}" srcId="{8A66127B-8701-437B-8916-9906DC5501DC}" destId="{DE329CAE-97B2-47BF-81D4-456AD1EFC57C}" srcOrd="1" destOrd="0" parTransId="{DB92E5F0-3CD1-471A-AD44-B87D67176B3C}" sibTransId="{6BD1F31A-65E9-4971-A032-3F7CF03BC94F}"/>
-    <dgm:cxn modelId="{EF70C8A4-0222-41CB-8170-CB62D2D73FEC}" type="presOf" srcId="{3DC1EE45-D6BC-49E9-A088-F619C40C8937}" destId="{027C34B1-0C9E-47AB-9411-6B3BF5AF8157}" srcOrd="0" destOrd="0" presId="urn:microsoft.com/office/officeart/2005/8/layout/vList2"/>
-    <dgm:cxn modelId="{8934BBD4-166E-48ED-88C3-C3AAFA9517BA}" type="presOf" srcId="{DE329CAE-97B2-47BF-81D4-456AD1EFC57C}" destId="{D2ADFF34-4251-41E1-8037-25AD6CB395A5}" srcOrd="0" destOrd="0" presId="urn:microsoft.com/office/officeart/2005/8/layout/vList2"/>
-    <dgm:cxn modelId="{E6CE45E4-4CA9-4401-AA67-838FB27B2BEF}" srcId="{8A66127B-8701-437B-8916-9906DC5501DC}" destId="{DB226214-406E-4ADF-8EA6-8FBDEFBCB602}" srcOrd="2" destOrd="0" parTransId="{99A85BB0-D30F-4B02-89AC-22F61488CA90}" sibTransId="{28FBBA63-11A2-4229-B6AE-D92BAE56AE3F}"/>
     <dgm:cxn modelId="{7912627D-F4A5-472F-A876-82E3BB025417}" type="presParOf" srcId="{B286A3B5-B73B-43FF-8283-84CFE32D6629}" destId="{027C34B1-0C9E-47AB-9411-6B3BF5AF8157}" srcOrd="0" destOrd="0" presId="urn:microsoft.com/office/officeart/2005/8/layout/vList2"/>
     <dgm:cxn modelId="{A717E3A4-21EC-4C93-B586-EC0CAC1957CB}" type="presParOf" srcId="{B286A3B5-B73B-43FF-8283-84CFE32D6629}" destId="{47D8A9D4-A50B-4F0C-B6B5-9B933D633038}" srcOrd="1" destOrd="0" presId="urn:microsoft.com/office/officeart/2005/8/layout/vList2"/>
     <dgm:cxn modelId="{107AF5B8-1336-4CF1-87D2-09C017CF6A9D}" type="presParOf" srcId="{B286A3B5-B73B-43FF-8283-84CFE32D6629}" destId="{D2ADFF34-4251-41E1-8037-25AD6CB395A5}" srcOrd="2" destOrd="0" presId="urn:microsoft.com/office/officeart/2005/8/layout/vList2"/>
@@ -7922,7 +8235,7 @@
         </a:bodyPr>
         <a:lstStyle/>
         <a:p>
-          <a:pPr marL="0" lvl="0" indent="0" algn="l" defTabSz="1422400">
+          <a:pPr lvl="0" algn="l" defTabSz="1422400">
             <a:lnSpc>
               <a:spcPct val="90000"/>
             </a:lnSpc>
@@ -7932,7 +8245,6 @@
             <a:spcAft>
               <a:spcPct val="35000"/>
             </a:spcAft>
-            <a:buNone/>
           </a:pPr>
           <a:r>
             <a:rPr lang="en-GB" sz="3200" kern="1200"/>
@@ -7993,7 +8305,7 @@
             <a:spcAft>
               <a:spcPct val="20000"/>
             </a:spcAft>
-            <a:buChar char="•"/>
+            <a:buChar char="••"/>
           </a:pPr>
           <a:r>
             <a:rPr lang="en-GB" sz="2500" kern="1200"/>
@@ -8062,7 +8374,7 @@
         </a:bodyPr>
         <a:lstStyle/>
         <a:p>
-          <a:pPr marL="0" lvl="0" indent="0" algn="l" defTabSz="1422400">
+          <a:pPr lvl="0" algn="l" defTabSz="1422400">
             <a:lnSpc>
               <a:spcPct val="90000"/>
             </a:lnSpc>
@@ -8072,7 +8384,6 @@
             <a:spcAft>
               <a:spcPct val="35000"/>
             </a:spcAft>
-            <a:buNone/>
           </a:pPr>
           <a:r>
             <a:rPr lang="en-GB" sz="3200" kern="1200"/>
@@ -8133,7 +8444,7 @@
             <a:spcAft>
               <a:spcPct val="20000"/>
             </a:spcAft>
-            <a:buChar char="•"/>
+            <a:buChar char="••"/>
           </a:pPr>
           <a:r>
             <a:rPr lang="en-GB" sz="2500" kern="1200"/>
@@ -8202,7 +8513,7 @@
         </a:bodyPr>
         <a:lstStyle/>
         <a:p>
-          <a:pPr marL="0" lvl="0" indent="0" algn="l" defTabSz="1422400">
+          <a:pPr lvl="0" algn="l" defTabSz="1422400">
             <a:lnSpc>
               <a:spcPct val="90000"/>
             </a:lnSpc>
@@ -8212,7 +8523,6 @@
             <a:spcAft>
               <a:spcPct val="35000"/>
             </a:spcAft>
-            <a:buNone/>
           </a:pPr>
           <a:r>
             <a:rPr lang="en-GB" sz="3200" kern="1200"/>
@@ -8273,7 +8583,7 @@
             <a:spcAft>
               <a:spcPct val="20000"/>
             </a:spcAft>
-            <a:buChar char="•"/>
+            <a:buChar char="••"/>
           </a:pPr>
           <a:r>
             <a:rPr lang="en-GB" sz="2500" kern="1200"/>
@@ -8342,7 +8652,7 @@
         </a:bodyPr>
         <a:lstStyle/>
         <a:p>
-          <a:pPr marL="0" lvl="0" indent="0" algn="l" defTabSz="1422400">
+          <a:pPr lvl="0" algn="l" defTabSz="1422400">
             <a:lnSpc>
               <a:spcPct val="90000"/>
             </a:lnSpc>
@@ -8352,7 +8662,6 @@
             <a:spcAft>
               <a:spcPct val="35000"/>
             </a:spcAft>
-            <a:buNone/>
           </a:pPr>
           <a:r>
             <a:rPr lang="en-GB" sz="3200" kern="1200"/>
@@ -8413,7 +8722,7 @@
             <a:spcAft>
               <a:spcPct val="20000"/>
             </a:spcAft>
-            <a:buChar char="•"/>
+            <a:buChar char="••"/>
           </a:pPr>
           <a:r>
             <a:rPr lang="en-GB" sz="2500" kern="1200"/>
@@ -8494,13 +8803,13 @@
           <a:avLst/>
         </a:prstGeom>
         <a:blipFill>
-          <a:blip xmlns:r="http://schemas.openxmlformats.org/officeDocument/2006/relationships" r:embed="rId1">
+          <a:blip xmlns:r="http://schemas.openxmlformats.org/officeDocument/2006/relationships" r:embed="rId1" cstate="hqprint">
             <a:extLst>
               <a:ext uri="{28A0092B-C50C-407E-A947-70E740481C1C}">
                 <a14:useLocalDpi xmlns:a14="http://schemas.microsoft.com/office/drawing/2010/main" val="0"/>
               </a:ext>
               <a:ext uri="{96DAC541-7B7A-43D3-8B79-37D633B846F1}">
-                <asvg:svgBlip xmlns:asvg="http://schemas.microsoft.com/office/drawing/2016/SVG/main" r:embed="rId2"/>
+                <asvg:svgBlip xmlns:asvg="http://schemas.microsoft.com/office/drawing/2016/SVG/main" xmlns="" r:embed="rId2"/>
               </a:ext>
             </a:extLst>
           </a:blip>
@@ -8565,7 +8874,7 @@
         </a:bodyPr>
         <a:lstStyle/>
         <a:p>
-          <a:pPr marL="0" lvl="0" indent="0" algn="l" defTabSz="666750">
+          <a:pPr lvl="0" algn="l" defTabSz="666750">
             <a:lnSpc>
               <a:spcPct val="90000"/>
             </a:lnSpc>
@@ -8575,7 +8884,6 @@
             <a:spcAft>
               <a:spcPct val="35000"/>
             </a:spcAft>
-            <a:buNone/>
           </a:pPr>
           <a:r>
             <a:rPr lang="en-GB" sz="1500" kern="1200" dirty="0"/>
@@ -8644,13 +8952,13 @@
           <a:avLst/>
         </a:prstGeom>
         <a:blipFill>
-          <a:blip xmlns:r="http://schemas.openxmlformats.org/officeDocument/2006/relationships" r:embed="rId3">
+          <a:blip xmlns:r="http://schemas.openxmlformats.org/officeDocument/2006/relationships" r:embed="rId3" cstate="hqprint">
             <a:extLst>
               <a:ext uri="{28A0092B-C50C-407E-A947-70E740481C1C}">
                 <a14:useLocalDpi xmlns:a14="http://schemas.microsoft.com/office/drawing/2010/main" val="0"/>
               </a:ext>
               <a:ext uri="{96DAC541-7B7A-43D3-8B79-37D633B846F1}">
-                <asvg:svgBlip xmlns:asvg="http://schemas.microsoft.com/office/drawing/2016/SVG/main" r:embed="rId4"/>
+                <asvg:svgBlip xmlns:asvg="http://schemas.microsoft.com/office/drawing/2016/SVG/main" xmlns="" r:embed="rId4"/>
               </a:ext>
             </a:extLst>
           </a:blip>
@@ -8715,7 +9023,7 @@
         </a:bodyPr>
         <a:lstStyle/>
         <a:p>
-          <a:pPr marL="0" lvl="0" indent="0" algn="l" defTabSz="666750">
+          <a:pPr lvl="0" algn="l" defTabSz="666750">
             <a:lnSpc>
               <a:spcPct val="90000"/>
             </a:lnSpc>
@@ -8725,7 +9033,6 @@
             <a:spcAft>
               <a:spcPct val="35000"/>
             </a:spcAft>
-            <a:buNone/>
           </a:pPr>
           <a:r>
             <a:rPr lang="en-GB" sz="1500" kern="1200"/>
@@ -8794,13 +9101,13 @@
           <a:avLst/>
         </a:prstGeom>
         <a:blipFill>
-          <a:blip xmlns:r="http://schemas.openxmlformats.org/officeDocument/2006/relationships" r:embed="rId5">
+          <a:blip xmlns:r="http://schemas.openxmlformats.org/officeDocument/2006/relationships" r:embed="rId5" cstate="hqprint">
             <a:extLst>
               <a:ext uri="{28A0092B-C50C-407E-A947-70E740481C1C}">
                 <a14:useLocalDpi xmlns:a14="http://schemas.microsoft.com/office/drawing/2010/main" val="0"/>
               </a:ext>
               <a:ext uri="{96DAC541-7B7A-43D3-8B79-37D633B846F1}">
-                <asvg:svgBlip xmlns:asvg="http://schemas.microsoft.com/office/drawing/2016/SVG/main" r:embed="rId6"/>
+                <asvg:svgBlip xmlns:asvg="http://schemas.microsoft.com/office/drawing/2016/SVG/main" xmlns="" r:embed="rId6"/>
               </a:ext>
             </a:extLst>
           </a:blip>
@@ -8865,7 +9172,7 @@
         </a:bodyPr>
         <a:lstStyle/>
         <a:p>
-          <a:pPr marL="0" lvl="0" indent="0" algn="l" defTabSz="666750">
+          <a:pPr lvl="0" algn="l" defTabSz="666750">
             <a:lnSpc>
               <a:spcPct val="90000"/>
             </a:lnSpc>
@@ -8875,7 +9182,6 @@
             <a:spcAft>
               <a:spcPct val="35000"/>
             </a:spcAft>
-            <a:buNone/>
           </a:pPr>
           <a:r>
             <a:rPr lang="en-GB" sz="1500" kern="1200"/>
@@ -8944,13 +9250,13 @@
           <a:avLst/>
         </a:prstGeom>
         <a:blipFill>
-          <a:blip xmlns:r="http://schemas.openxmlformats.org/officeDocument/2006/relationships" r:embed="rId7">
+          <a:blip xmlns:r="http://schemas.openxmlformats.org/officeDocument/2006/relationships" r:embed="rId7" cstate="hqprint">
             <a:extLst>
               <a:ext uri="{28A0092B-C50C-407E-A947-70E740481C1C}">
                 <a14:useLocalDpi xmlns:a14="http://schemas.microsoft.com/office/drawing/2010/main" val="0"/>
               </a:ext>
               <a:ext uri="{96DAC541-7B7A-43D3-8B79-37D633B846F1}">
-                <asvg:svgBlip xmlns:asvg="http://schemas.microsoft.com/office/drawing/2016/SVG/main" r:embed="rId8"/>
+                <asvg:svgBlip xmlns:asvg="http://schemas.microsoft.com/office/drawing/2016/SVG/main" xmlns="" r:embed="rId8"/>
               </a:ext>
             </a:extLst>
           </a:blip>
@@ -9015,7 +9321,7 @@
         </a:bodyPr>
         <a:lstStyle/>
         <a:p>
-          <a:pPr marL="0" lvl="0" indent="0" algn="l" defTabSz="666750">
+          <a:pPr lvl="0" algn="l" defTabSz="666750">
             <a:lnSpc>
               <a:spcPct val="90000"/>
             </a:lnSpc>
@@ -9025,7 +9331,6 @@
             <a:spcAft>
               <a:spcPct val="35000"/>
             </a:spcAft>
-            <a:buNone/>
           </a:pPr>
           <a:r>
             <a:rPr lang="en-GB" sz="1500" kern="1200"/>
@@ -9094,13 +9399,13 @@
           <a:avLst/>
         </a:prstGeom>
         <a:blipFill>
-          <a:blip xmlns:r="http://schemas.openxmlformats.org/officeDocument/2006/relationships" r:embed="rId9">
+          <a:blip xmlns:r="http://schemas.openxmlformats.org/officeDocument/2006/relationships" r:embed="rId9" cstate="hqprint">
             <a:extLst>
               <a:ext uri="{28A0092B-C50C-407E-A947-70E740481C1C}">
                 <a14:useLocalDpi xmlns:a14="http://schemas.microsoft.com/office/drawing/2010/main" val="0"/>
               </a:ext>
               <a:ext uri="{96DAC541-7B7A-43D3-8B79-37D633B846F1}">
-                <asvg:svgBlip xmlns:asvg="http://schemas.microsoft.com/office/drawing/2016/SVG/main" r:embed="rId10"/>
+                <asvg:svgBlip xmlns:asvg="http://schemas.microsoft.com/office/drawing/2016/SVG/main" xmlns="" r:embed="rId10"/>
               </a:ext>
             </a:extLst>
           </a:blip>
@@ -9165,7 +9470,7 @@
         </a:bodyPr>
         <a:lstStyle/>
         <a:p>
-          <a:pPr marL="0" lvl="0" indent="0" algn="l" defTabSz="666750">
+          <a:pPr lvl="0" algn="l" defTabSz="666750">
             <a:lnSpc>
               <a:spcPct val="90000"/>
             </a:lnSpc>
@@ -9175,7 +9480,6 @@
             <a:spcAft>
               <a:spcPct val="35000"/>
             </a:spcAft>
-            <a:buNone/>
           </a:pPr>
           <a:r>
             <a:rPr lang="en-GB" sz="1500" kern="1200"/>
@@ -9244,13 +9548,13 @@
           <a:avLst/>
         </a:prstGeom>
         <a:blipFill>
-          <a:blip xmlns:r="http://schemas.openxmlformats.org/officeDocument/2006/relationships" r:embed="rId11">
+          <a:blip xmlns:r="http://schemas.openxmlformats.org/officeDocument/2006/relationships" r:embed="rId11" cstate="hqprint">
             <a:extLst>
               <a:ext uri="{28A0092B-C50C-407E-A947-70E740481C1C}">
                 <a14:useLocalDpi xmlns:a14="http://schemas.microsoft.com/office/drawing/2010/main" val="0"/>
               </a:ext>
               <a:ext uri="{96DAC541-7B7A-43D3-8B79-37D633B846F1}">
-                <asvg:svgBlip xmlns:asvg="http://schemas.microsoft.com/office/drawing/2016/SVG/main" r:embed="rId12"/>
+                <asvg:svgBlip xmlns:asvg="http://schemas.microsoft.com/office/drawing/2016/SVG/main" xmlns="" r:embed="rId12"/>
               </a:ext>
             </a:extLst>
           </a:blip>
@@ -9315,7 +9619,7 @@
         </a:bodyPr>
         <a:lstStyle/>
         <a:p>
-          <a:pPr marL="0" lvl="0" indent="0" algn="l" defTabSz="666750">
+          <a:pPr lvl="0" algn="l" defTabSz="666750">
             <a:lnSpc>
               <a:spcPct val="90000"/>
             </a:lnSpc>
@@ -9325,7 +9629,6 @@
             <a:spcAft>
               <a:spcPct val="35000"/>
             </a:spcAft>
-            <a:buNone/>
           </a:pPr>
           <a:r>
             <a:rPr lang="en-GB" sz="1500" kern="1200" dirty="0"/>
@@ -9406,7 +9709,7 @@
         </a:bodyPr>
         <a:lstStyle/>
         <a:p>
-          <a:pPr marL="0" lvl="0" indent="0" algn="l" defTabSz="1733550">
+          <a:pPr lvl="0" algn="l" defTabSz="1733550">
             <a:lnSpc>
               <a:spcPct val="90000"/>
             </a:lnSpc>
@@ -9416,7 +9719,6 @@
             <a:spcAft>
               <a:spcPct val="35000"/>
             </a:spcAft>
-            <a:buNone/>
           </a:pPr>
           <a:r>
             <a:rPr lang="en-GB" sz="3900" kern="1200"/>
@@ -9485,7 +9787,7 @@
         </a:bodyPr>
         <a:lstStyle/>
         <a:p>
-          <a:pPr marL="0" lvl="0" indent="0" algn="l" defTabSz="1733550">
+          <a:pPr lvl="0" algn="l" defTabSz="1733550">
             <a:lnSpc>
               <a:spcPct val="90000"/>
             </a:lnSpc>
@@ -9495,7 +9797,6 @@
             <a:spcAft>
               <a:spcPct val="35000"/>
             </a:spcAft>
-            <a:buNone/>
           </a:pPr>
           <a:r>
             <a:rPr lang="en-GB" sz="3900" kern="1200"/>
@@ -9564,7 +9865,7 @@
         </a:bodyPr>
         <a:lstStyle/>
         <a:p>
-          <a:pPr marL="0" lvl="0" indent="0" algn="l" defTabSz="1733550">
+          <a:pPr lvl="0" algn="l" defTabSz="1733550">
             <a:lnSpc>
               <a:spcPct val="90000"/>
             </a:lnSpc>
@@ -9574,7 +9875,6 @@
             <a:spcAft>
               <a:spcPct val="35000"/>
             </a:spcAft>
-            <a:buNone/>
           </a:pPr>
           <a:r>
             <a:rPr lang="en-GB" sz="3900" kern="1200"/>
@@ -9655,7 +9955,7 @@
         </a:bodyPr>
         <a:lstStyle/>
         <a:p>
-          <a:pPr marL="0" lvl="0" indent="0" algn="l" defTabSz="2089150">
+          <a:pPr lvl="0" algn="l" defTabSz="2089150">
             <a:lnSpc>
               <a:spcPct val="90000"/>
             </a:lnSpc>
@@ -9665,7 +9965,6 @@
             <a:spcAft>
               <a:spcPct val="35000"/>
             </a:spcAft>
-            <a:buNone/>
           </a:pPr>
           <a:r>
             <a:rPr lang="en-GB" sz="4700" kern="1200"/>
@@ -9734,7 +10033,7 @@
         </a:bodyPr>
         <a:lstStyle/>
         <a:p>
-          <a:pPr marL="0" lvl="0" indent="0" algn="l" defTabSz="2089150">
+          <a:pPr lvl="0" algn="l" defTabSz="2089150">
             <a:lnSpc>
               <a:spcPct val="90000"/>
             </a:lnSpc>
@@ -9744,7 +10043,6 @@
             <a:spcAft>
               <a:spcPct val="35000"/>
             </a:spcAft>
-            <a:buNone/>
           </a:pPr>
           <a:r>
             <a:rPr lang="en-GB" sz="4700" kern="1200" dirty="0"/>
@@ -9813,7 +10111,7 @@
         </a:bodyPr>
         <a:lstStyle/>
         <a:p>
-          <a:pPr marL="0" lvl="0" indent="0" algn="l" defTabSz="2089150">
+          <a:pPr lvl="0" algn="l" defTabSz="2089150">
             <a:lnSpc>
               <a:spcPct val="90000"/>
             </a:lnSpc>
@@ -9823,7 +10121,6 @@
             <a:spcAft>
               <a:spcPct val="35000"/>
             </a:spcAft>
-            <a:buNone/>
           </a:pPr>
           <a:r>
             <a:rPr lang="en-GB" sz="4700" kern="1200" dirty="0"/>
@@ -9904,7 +10201,7 @@
         </a:bodyPr>
         <a:lstStyle/>
         <a:p>
-          <a:pPr marL="0" lvl="0" indent="0" algn="l" defTabSz="1555750">
+          <a:pPr lvl="0" algn="l" defTabSz="1555750">
             <a:lnSpc>
               <a:spcPct val="90000"/>
             </a:lnSpc>
@@ -9914,7 +10211,6 @@
             <a:spcAft>
               <a:spcPct val="35000"/>
             </a:spcAft>
-            <a:buNone/>
           </a:pPr>
           <a:r>
             <a:rPr lang="en-GB" sz="3500" kern="1200" dirty="0"/>
@@ -9983,7 +10279,7 @@
         </a:bodyPr>
         <a:lstStyle/>
         <a:p>
-          <a:pPr marL="0" lvl="0" indent="0" algn="l" defTabSz="1555750">
+          <a:pPr lvl="0" algn="l" defTabSz="1555750">
             <a:lnSpc>
               <a:spcPct val="90000"/>
             </a:lnSpc>
@@ -9993,7 +10289,6 @@
             <a:spcAft>
               <a:spcPct val="35000"/>
             </a:spcAft>
-            <a:buNone/>
           </a:pPr>
           <a:r>
             <a:rPr lang="en-GB" sz="3500" kern="1200" dirty="0"/>
@@ -10062,7 +10357,7 @@
         </a:bodyPr>
         <a:lstStyle/>
         <a:p>
-          <a:pPr marL="0" lvl="0" indent="0" algn="l" defTabSz="1555750">
+          <a:pPr lvl="0" algn="l" defTabSz="1555750">
             <a:lnSpc>
               <a:spcPct val="90000"/>
             </a:lnSpc>
@@ -10072,7 +10367,6 @@
             <a:spcAft>
               <a:spcPct val="35000"/>
             </a:spcAft>
-            <a:buNone/>
           </a:pPr>
           <a:r>
             <a:rPr lang="en-GB" sz="3500" kern="1200"/>
@@ -10141,7 +10435,7 @@
         </a:bodyPr>
         <a:lstStyle/>
         <a:p>
-          <a:pPr marL="0" lvl="0" indent="0" algn="l" defTabSz="1555750">
+          <a:pPr lvl="0" algn="l" defTabSz="1555750">
             <a:lnSpc>
               <a:spcPct val="90000"/>
             </a:lnSpc>
@@ -10151,7 +10445,6 @@
             <a:spcAft>
               <a:spcPct val="35000"/>
             </a:spcAft>
-            <a:buNone/>
           </a:pPr>
           <a:r>
             <a:rPr lang="en-GB" sz="3500" kern="1200" dirty="0"/>
@@ -10253,7 +10546,7 @@
         </a:bodyPr>
         <a:lstStyle/>
         <a:p>
-          <a:pPr marL="0" lvl="0" indent="0" algn="l" defTabSz="1555750">
+          <a:pPr lvl="0" algn="l" defTabSz="1555750">
             <a:lnSpc>
               <a:spcPct val="90000"/>
             </a:lnSpc>
@@ -10263,7 +10556,6 @@
             <a:spcAft>
               <a:spcPct val="35000"/>
             </a:spcAft>
-            <a:buNone/>
           </a:pPr>
           <a:r>
             <a:rPr lang="en-GB" sz="3500" kern="1200"/>
@@ -10353,7 +10645,7 @@
         </a:bodyPr>
         <a:lstStyle/>
         <a:p>
-          <a:pPr marL="0" lvl="0" indent="0" algn="l" defTabSz="1555750">
+          <a:pPr lvl="0" algn="l" defTabSz="1555750">
             <a:lnSpc>
               <a:spcPct val="90000"/>
             </a:lnSpc>
@@ -10363,7 +10655,6 @@
             <a:spcAft>
               <a:spcPct val="35000"/>
             </a:spcAft>
-            <a:buNone/>
           </a:pPr>
           <a:r>
             <a:rPr lang="en-GB" sz="3500" kern="1200"/>
@@ -10453,7 +10744,7 @@
         </a:bodyPr>
         <a:lstStyle/>
         <a:p>
-          <a:pPr marL="0" lvl="0" indent="0" algn="l" defTabSz="1555750">
+          <a:pPr lvl="0" algn="l" defTabSz="1555750">
             <a:lnSpc>
               <a:spcPct val="90000"/>
             </a:lnSpc>
@@ -10463,7 +10754,6 @@
             <a:spcAft>
               <a:spcPct val="35000"/>
             </a:spcAft>
-            <a:buNone/>
           </a:pPr>
           <a:r>
             <a:rPr lang="en-GB" sz="3500" kern="1200" dirty="0"/>
@@ -10553,7 +10843,7 @@
         </a:bodyPr>
         <a:lstStyle/>
         <a:p>
-          <a:pPr marL="0" lvl="0" indent="0" algn="l" defTabSz="1555750">
+          <a:pPr lvl="0" algn="l" defTabSz="1555750">
             <a:lnSpc>
               <a:spcPct val="90000"/>
             </a:lnSpc>
@@ -10563,7 +10853,6 @@
             <a:spcAft>
               <a:spcPct val="35000"/>
             </a:spcAft>
-            <a:buNone/>
           </a:pPr>
           <a:r>
             <a:rPr lang="en-GB" sz="3500" kern="1200" dirty="0"/>
@@ -10665,7 +10954,7 @@
         </a:bodyPr>
         <a:lstStyle/>
         <a:p>
-          <a:pPr marL="0" lvl="0" indent="0" algn="l" defTabSz="1689100">
+          <a:pPr lvl="0" algn="l" defTabSz="1689100">
             <a:lnSpc>
               <a:spcPct val="90000"/>
             </a:lnSpc>
@@ -10675,7 +10964,6 @@
             <a:spcAft>
               <a:spcPct val="35000"/>
             </a:spcAft>
-            <a:buNone/>
           </a:pPr>
           <a:r>
             <a:rPr lang="en-GB" sz="3800" kern="1200"/>
@@ -10765,7 +11053,7 @@
         </a:bodyPr>
         <a:lstStyle/>
         <a:p>
-          <a:pPr marL="0" lvl="0" indent="0" algn="l" defTabSz="1689100">
+          <a:pPr lvl="0" algn="l" defTabSz="1689100">
             <a:lnSpc>
               <a:spcPct val="90000"/>
             </a:lnSpc>
@@ -10775,7 +11063,6 @@
             <a:spcAft>
               <a:spcPct val="35000"/>
             </a:spcAft>
-            <a:buNone/>
           </a:pPr>
           <a:r>
             <a:rPr lang="en-GB" sz="3800" kern="1200"/>
@@ -10865,7 +11152,7 @@
         </a:bodyPr>
         <a:lstStyle/>
         <a:p>
-          <a:pPr marL="0" lvl="0" indent="0" algn="l" defTabSz="1689100">
+          <a:pPr lvl="0" algn="l" defTabSz="1689100">
             <a:lnSpc>
               <a:spcPct val="90000"/>
             </a:lnSpc>
@@ -10875,7 +11162,6 @@
             <a:spcAft>
               <a:spcPct val="35000"/>
             </a:spcAft>
-            <a:buNone/>
           </a:pPr>
           <a:r>
             <a:rPr lang="en-GB" sz="3800" kern="1200" dirty="0"/>
@@ -11337,7 +11623,7 @@
   </dgm:layoutNode>
   <dgm:extLst>
     <a:ext uri="{68A01E43-0DF5-4B5B-8FA6-DAF915123BFB}">
-      <dgm1612:lstStyle xmlns:dgm1612="http://schemas.microsoft.com/office/drawing/2016/12/diagram">
+      <dgm1612:lstStyle xmlns:dgm1612="http://schemas.microsoft.com/office/drawing/2016/12/diagram" xmlns="">
         <a:lvl1pPr>
           <a:lnSpc>
             <a:spcPct val="100000"/>
@@ -19509,7 +19795,7 @@
           <a:p>
             <a:fld id="{F80817B6-7F69-4623-92EA-524682D80F55}" type="datetimeFigureOut">
               <a:rPr lang="en-GB" smtClean="0"/>
-              <a:t>18/02/2019</a:t>
+              <a:t>27/06/2019</a:t>
             </a:fld>
             <a:endParaRPr lang="en-GB"/>
           </a:p>
@@ -20010,7 +20296,7 @@
           <a:p>
             <a:fld id="{CEC5A568-A1F7-4A00-8E08-66024C74D7DC}" type="datetimeFigureOut">
               <a:rPr lang="en-GB" smtClean="0"/>
-              <a:t>18/02/2019</a:t>
+              <a:t>27/06/2019</a:t>
             </a:fld>
             <a:endParaRPr lang="en-GB"/>
           </a:p>
@@ -20210,7 +20496,7 @@
           <a:p>
             <a:fld id="{CEC5A568-A1F7-4A00-8E08-66024C74D7DC}" type="datetimeFigureOut">
               <a:rPr lang="en-GB" smtClean="0"/>
-              <a:t>18/02/2019</a:t>
+              <a:t>27/06/2019</a:t>
             </a:fld>
             <a:endParaRPr lang="en-GB"/>
           </a:p>
@@ -20420,7 +20706,7 @@
           <a:p>
             <a:fld id="{CEC5A568-A1F7-4A00-8E08-66024C74D7DC}" type="datetimeFigureOut">
               <a:rPr lang="en-GB" smtClean="0"/>
-              <a:t>18/02/2019</a:t>
+              <a:t>27/06/2019</a:t>
             </a:fld>
             <a:endParaRPr lang="en-GB"/>
           </a:p>
@@ -20620,7 +20906,7 @@
           <a:p>
             <a:fld id="{CEC5A568-A1F7-4A00-8E08-66024C74D7DC}" type="datetimeFigureOut">
               <a:rPr lang="en-GB" smtClean="0"/>
-              <a:t>18/02/2019</a:t>
+              <a:t>27/06/2019</a:t>
             </a:fld>
             <a:endParaRPr lang="en-GB"/>
           </a:p>
@@ -20896,7 +21182,7 @@
           <a:p>
             <a:fld id="{CEC5A568-A1F7-4A00-8E08-66024C74D7DC}" type="datetimeFigureOut">
               <a:rPr lang="en-GB" smtClean="0"/>
-              <a:t>18/02/2019</a:t>
+              <a:t>27/06/2019</a:t>
             </a:fld>
             <a:endParaRPr lang="en-GB"/>
           </a:p>
@@ -21164,7 +21450,7 @@
           <a:p>
             <a:fld id="{CEC5A568-A1F7-4A00-8E08-66024C74D7DC}" type="datetimeFigureOut">
               <a:rPr lang="en-GB" smtClean="0"/>
-              <a:t>18/02/2019</a:t>
+              <a:t>27/06/2019</a:t>
             </a:fld>
             <a:endParaRPr lang="en-GB"/>
           </a:p>
@@ -21579,7 +21865,7 @@
           <a:p>
             <a:fld id="{CEC5A568-A1F7-4A00-8E08-66024C74D7DC}" type="datetimeFigureOut">
               <a:rPr lang="en-GB" smtClean="0"/>
-              <a:t>18/02/2019</a:t>
+              <a:t>27/06/2019</a:t>
             </a:fld>
             <a:endParaRPr lang="en-GB"/>
           </a:p>
@@ -21721,7 +22007,7 @@
           <a:p>
             <a:fld id="{CEC5A568-A1F7-4A00-8E08-66024C74D7DC}" type="datetimeFigureOut">
               <a:rPr lang="en-GB" smtClean="0"/>
-              <a:t>18/02/2019</a:t>
+              <a:t>27/06/2019</a:t>
             </a:fld>
             <a:endParaRPr lang="en-GB"/>
           </a:p>
@@ -21834,7 +22120,7 @@
           <a:p>
             <a:fld id="{CEC5A568-A1F7-4A00-8E08-66024C74D7DC}" type="datetimeFigureOut">
               <a:rPr lang="en-GB" smtClean="0"/>
-              <a:t>18/02/2019</a:t>
+              <a:t>27/06/2019</a:t>
             </a:fld>
             <a:endParaRPr lang="en-GB"/>
           </a:p>
@@ -22147,7 +22433,7 @@
           <a:p>
             <a:fld id="{CEC5A568-A1F7-4A00-8E08-66024C74D7DC}" type="datetimeFigureOut">
               <a:rPr lang="en-GB" smtClean="0"/>
-              <a:t>18/02/2019</a:t>
+              <a:t>27/06/2019</a:t>
             </a:fld>
             <a:endParaRPr lang="en-GB"/>
           </a:p>
@@ -22436,7 +22722,7 @@
           <a:p>
             <a:fld id="{CEC5A568-A1F7-4A00-8E08-66024C74D7DC}" type="datetimeFigureOut">
               <a:rPr lang="en-GB" smtClean="0"/>
-              <a:t>18/02/2019</a:t>
+              <a:t>27/06/2019</a:t>
             </a:fld>
             <a:endParaRPr lang="en-GB"/>
           </a:p>
@@ -22679,7 +22965,7 @@
           <a:p>
             <a:fld id="{CEC5A568-A1F7-4A00-8E08-66024C74D7DC}" type="datetimeFigureOut">
               <a:rPr lang="en-GB" smtClean="0"/>
-              <a:t>18/02/2019</a:t>
+              <a:t>27/06/2019</a:t>
             </a:fld>
             <a:endParaRPr lang="en-GB"/>
           </a:p>
@@ -23152,7 +23438,7 @@
                 <a16:creationId xmlns:a16="http://schemas.microsoft.com/office/drawing/2014/main" id="{793EF0C2-EE57-40DD-B754-BF1477FABABB}"/>
               </a:ext>
               <a:ext uri="{C183D7F6-B498-43B3-948B-1728B52AA6E4}">
-                <adec:decorative xmlns:adec="http://schemas.microsoft.com/office/drawing/2017/decorative" val="1"/>
+                <adec:decorative xmlns:adec="http://schemas.microsoft.com/office/drawing/2017/decorative" xmlns="" val="1"/>
               </a:ext>
             </a:extLst>
           </p:cNvPr>
@@ -23269,12 +23555,20 @@
           <a:p>
             <a:pPr algn="l"/>
             <a:r>
+              <a:rPr lang="en-GB" sz="2000" dirty="0" smtClean="0">
+                <a:solidFill>
+                  <a:srgbClr val="FFFFFF"/>
+                </a:solidFill>
+              </a:rPr>
+              <a:t>June </a:t>
+            </a:r>
+            <a:r>
               <a:rPr lang="en-GB" sz="2000" dirty="0">
                 <a:solidFill>
                   <a:srgbClr val="FFFFFF"/>
                 </a:solidFill>
               </a:rPr>
-              <a:t>February 2019</a:t>
+              <a:t>2019</a:t>
             </a:r>
           </a:p>
         </p:txBody>
@@ -23325,7 +23619,7 @@
                 <a16:creationId xmlns:a16="http://schemas.microsoft.com/office/drawing/2014/main" id="{46C2E80F-49A6-4372-B103-219D417A55ED}"/>
               </a:ext>
               <a:ext uri="{C183D7F6-B498-43B3-948B-1728B52AA6E4}">
-                <adec:decorative xmlns:adec="http://schemas.microsoft.com/office/drawing/2017/decorative" val="1"/>
+                <adec:decorative xmlns:adec="http://schemas.microsoft.com/office/drawing/2017/decorative" xmlns="" val="1"/>
               </a:ext>
             </a:extLst>
           </p:cNvPr>
@@ -23952,7 +24246,7 @@
                 <a16:creationId xmlns:a16="http://schemas.microsoft.com/office/drawing/2014/main" id="{AB45A142-4255-493C-8284-5D566C121B10}"/>
               </a:ext>
               <a:ext uri="{C183D7F6-B498-43B3-948B-1728B52AA6E4}">
-                <adec:decorative xmlns:adec="http://schemas.microsoft.com/office/drawing/2017/decorative" val="1"/>
+                <adec:decorative xmlns:adec="http://schemas.microsoft.com/office/drawing/2017/decorative" xmlns="" val="1"/>
               </a:ext>
             </a:extLst>
           </p:cNvPr>
@@ -24064,7 +24358,7 @@
                 <a16:creationId xmlns:a16="http://schemas.microsoft.com/office/drawing/2014/main" id="{38FB9660-F42F-4313-BBC4-47C007FE484C}"/>
               </a:ext>
               <a:ext uri="{C183D7F6-B498-43B3-948B-1728B52AA6E4}">
-                <adec:decorative xmlns:adec="http://schemas.microsoft.com/office/drawing/2017/decorative" val="1"/>
+                <adec:decorative xmlns:adec="http://schemas.microsoft.com/office/drawing/2017/decorative" xmlns="" val="1"/>
               </a:ext>
             </a:extLst>
           </p:cNvPr>
@@ -24154,7 +24448,7 @@
                 <a16:creationId xmlns:a16="http://schemas.microsoft.com/office/drawing/2014/main" id="{46C2E80F-49A6-4372-B103-219D417A55ED}"/>
               </a:ext>
               <a:ext uri="{C183D7F6-B498-43B3-948B-1728B52AA6E4}">
-                <adec:decorative xmlns:adec="http://schemas.microsoft.com/office/drawing/2017/decorative" val="1"/>
+                <adec:decorative xmlns:adec="http://schemas.microsoft.com/office/drawing/2017/decorative" xmlns="" val="1"/>
               </a:ext>
             </a:extLst>
           </p:cNvPr>
@@ -24779,7 +25073,7 @@
                 <a16:creationId xmlns:a16="http://schemas.microsoft.com/office/drawing/2014/main" id="{AB45A142-4255-493C-8284-5D566C121B10}"/>
               </a:ext>
               <a:ext uri="{C183D7F6-B498-43B3-948B-1728B52AA6E4}">
-                <adec:decorative xmlns:adec="http://schemas.microsoft.com/office/drawing/2017/decorative" val="1"/>
+                <adec:decorative xmlns:adec="http://schemas.microsoft.com/office/drawing/2017/decorative" xmlns="" val="1"/>
               </a:ext>
             </a:extLst>
           </p:cNvPr>
@@ -24891,7 +25185,7 @@
                 <a16:creationId xmlns:a16="http://schemas.microsoft.com/office/drawing/2014/main" id="{38FB9660-F42F-4313-BBC4-47C007FE484C}"/>
               </a:ext>
               <a:ext uri="{C183D7F6-B498-43B3-948B-1728B52AA6E4}">
-                <adec:decorative xmlns:adec="http://schemas.microsoft.com/office/drawing/2017/decorative" val="1"/>
+                <adec:decorative xmlns:adec="http://schemas.microsoft.com/office/drawing/2017/decorative" xmlns="" val="1"/>
               </a:ext>
             </a:extLst>
           </p:cNvPr>
@@ -24981,7 +25275,7 @@
                 <a16:creationId xmlns:a16="http://schemas.microsoft.com/office/drawing/2014/main" id="{46C2E80F-49A6-4372-B103-219D417A55ED}"/>
               </a:ext>
               <a:ext uri="{C183D7F6-B498-43B3-948B-1728B52AA6E4}">
-                <adec:decorative xmlns:adec="http://schemas.microsoft.com/office/drawing/2017/decorative" val="1"/>
+                <adec:decorative xmlns:adec="http://schemas.microsoft.com/office/drawing/2017/decorative" xmlns="" val="1"/>
               </a:ext>
             </a:extLst>
           </p:cNvPr>
@@ -25570,7 +25864,7 @@
                 <a16:creationId xmlns:a16="http://schemas.microsoft.com/office/drawing/2014/main" id="{46C2E80F-49A6-4372-B103-219D417A55ED}"/>
               </a:ext>
               <a:ext uri="{C183D7F6-B498-43B3-948B-1728B52AA6E4}">
-                <adec:decorative xmlns:adec="http://schemas.microsoft.com/office/drawing/2017/decorative" val="1"/>
+                <adec:decorative xmlns:adec="http://schemas.microsoft.com/office/drawing/2017/decorative" xmlns="" val="1"/>
               </a:ext>
             </a:extLst>
           </p:cNvPr>
@@ -26159,7 +26453,7 @@
                 <a16:creationId xmlns:a16="http://schemas.microsoft.com/office/drawing/2014/main" id="{46C2E80F-49A6-4372-B103-219D417A55ED}"/>
               </a:ext>
               <a:ext uri="{C183D7F6-B498-43B3-948B-1728B52AA6E4}">
-                <adec:decorative xmlns:adec="http://schemas.microsoft.com/office/drawing/2017/decorative" val="1"/>
+                <adec:decorative xmlns:adec="http://schemas.microsoft.com/office/drawing/2017/decorative" xmlns="" val="1"/>
               </a:ext>
             </a:extLst>
           </p:cNvPr>
@@ -26794,7 +27088,7 @@
                 <a16:creationId xmlns:a16="http://schemas.microsoft.com/office/drawing/2014/main" id="{793EF0C2-EE57-40DD-B754-BF1477FABABB}"/>
               </a:ext>
               <a:ext uri="{C183D7F6-B498-43B3-948B-1728B52AA6E4}">
-                <adec:decorative xmlns:adec="http://schemas.microsoft.com/office/drawing/2017/decorative" val="1"/>
+                <adec:decorative xmlns:adec="http://schemas.microsoft.com/office/drawing/2017/decorative" xmlns="" val="1"/>
               </a:ext>
             </a:extLst>
           </p:cNvPr>
@@ -26897,7 +27191,7 @@
                 <a16:creationId xmlns:a16="http://schemas.microsoft.com/office/drawing/2014/main" id="{AB45A142-4255-493C-8284-5D566C121B10}"/>
               </a:ext>
               <a:ext uri="{C183D7F6-B498-43B3-948B-1728B52AA6E4}">
-                <adec:decorative xmlns:adec="http://schemas.microsoft.com/office/drawing/2017/decorative" val="1"/>
+                <adec:decorative xmlns:adec="http://schemas.microsoft.com/office/drawing/2017/decorative" xmlns="" val="1"/>
               </a:ext>
             </a:extLst>
           </p:cNvPr>
@@ -27009,7 +27303,7 @@
                 <a16:creationId xmlns:a16="http://schemas.microsoft.com/office/drawing/2014/main" id="{38FB9660-F42F-4313-BBC4-47C007FE484C}"/>
               </a:ext>
               <a:ext uri="{C183D7F6-B498-43B3-948B-1728B52AA6E4}">
-                <adec:decorative xmlns:adec="http://schemas.microsoft.com/office/drawing/2017/decorative" val="1"/>
+                <adec:decorative xmlns:adec="http://schemas.microsoft.com/office/drawing/2017/decorative" xmlns="" val="1"/>
               </a:ext>
             </a:extLst>
           </p:cNvPr>
@@ -27135,7 +27429,7 @@
                 <a16:creationId xmlns:a16="http://schemas.microsoft.com/office/drawing/2014/main" id="{46C2E80F-49A6-4372-B103-219D417A55ED}"/>
               </a:ext>
               <a:ext uri="{C183D7F6-B498-43B3-948B-1728B52AA6E4}">
-                <adec:decorative xmlns:adec="http://schemas.microsoft.com/office/drawing/2017/decorative" val="1"/>
+                <adec:decorative xmlns:adec="http://schemas.microsoft.com/office/drawing/2017/decorative" xmlns="" val="1"/>
               </a:ext>
             </a:extLst>
           </p:cNvPr>
@@ -27724,7 +28018,7 @@
                 <a16:creationId xmlns:a16="http://schemas.microsoft.com/office/drawing/2014/main" id="{AB45A142-4255-493C-8284-5D566C121B10}"/>
               </a:ext>
               <a:ext uri="{C183D7F6-B498-43B3-948B-1728B52AA6E4}">
-                <adec:decorative xmlns:adec="http://schemas.microsoft.com/office/drawing/2017/decorative" val="1"/>
+                <adec:decorative xmlns:adec="http://schemas.microsoft.com/office/drawing/2017/decorative" xmlns="" val="1"/>
               </a:ext>
             </a:extLst>
           </p:cNvPr>
@@ -27836,7 +28130,7 @@
                 <a16:creationId xmlns:a16="http://schemas.microsoft.com/office/drawing/2014/main" id="{38FB9660-F42F-4313-BBC4-47C007FE484C}"/>
               </a:ext>
               <a:ext uri="{C183D7F6-B498-43B3-948B-1728B52AA6E4}">
-                <adec:decorative xmlns:adec="http://schemas.microsoft.com/office/drawing/2017/decorative" val="1"/>
+                <adec:decorative xmlns:adec="http://schemas.microsoft.com/office/drawing/2017/decorative" xmlns="" val="1"/>
               </a:ext>
             </a:extLst>
           </p:cNvPr>
@@ -27964,7 +28258,7 @@
                 <a16:creationId xmlns:a16="http://schemas.microsoft.com/office/drawing/2014/main" id="{46C2E80F-49A6-4372-B103-219D417A55ED}"/>
               </a:ext>
               <a:ext uri="{C183D7F6-B498-43B3-948B-1728B52AA6E4}">
-                <adec:decorative xmlns:adec="http://schemas.microsoft.com/office/drawing/2017/decorative" val="1"/>
+                <adec:decorative xmlns:adec="http://schemas.microsoft.com/office/drawing/2017/decorative" xmlns="" val="1"/>
               </a:ext>
             </a:extLst>
           </p:cNvPr>
@@ -28591,7 +28885,7 @@
                 <a16:creationId xmlns:a16="http://schemas.microsoft.com/office/drawing/2014/main" id="{AB45A142-4255-493C-8284-5D566C121B10}"/>
               </a:ext>
               <a:ext uri="{C183D7F6-B498-43B3-948B-1728B52AA6E4}">
-                <adec:decorative xmlns:adec="http://schemas.microsoft.com/office/drawing/2017/decorative" val="1"/>
+                <adec:decorative xmlns:adec="http://schemas.microsoft.com/office/drawing/2017/decorative" xmlns="" val="1"/>
               </a:ext>
             </a:extLst>
           </p:cNvPr>
@@ -28703,7 +28997,7 @@
                 <a16:creationId xmlns:a16="http://schemas.microsoft.com/office/drawing/2014/main" id="{38FB9660-F42F-4313-BBC4-47C007FE484C}"/>
               </a:ext>
               <a:ext uri="{C183D7F6-B498-43B3-948B-1728B52AA6E4}">
-                <adec:decorative xmlns:adec="http://schemas.microsoft.com/office/drawing/2017/decorative" val="1"/>
+                <adec:decorative xmlns:adec="http://schemas.microsoft.com/office/drawing/2017/decorative" xmlns="" val="1"/>
               </a:ext>
             </a:extLst>
           </p:cNvPr>

</xml_diff>